<commit_message>
Update docs and UI mockup (#30)
* Add template related information in docs

* Update UI mockup

* Update readme to use modified ui.png
</commit_message>
<xml_diff>
--- a/docs/UiMockup.pptx
+++ b/docs/UiMockup.pptx
@@ -6,6 +6,8 @@
   </p:sldMasterIdLst>
   <p:sldIdLst>
     <p:sldId id="256" r:id="rId2"/>
+    <p:sldId id="257" r:id="rId3"/>
+    <p:sldId id="258" r:id="rId4"/>
   </p:sldIdLst>
   <p:sldSz cx="12192000" cy="6858000"/>
   <p:notesSz cx="6858000" cy="9144000"/>
@@ -104,6 +106,11 @@
       </a:defRPr>
     </a:lvl9pPr>
   </p:defaultTextStyle>
+  <p:extLst>
+    <p:ext uri="{EFAFB233-063F-42B5-8137-9DF3F51BA10A}">
+      <p15:sldGuideLst xmlns:p15="http://schemas.microsoft.com/office/powerpoint/2012/main"/>
+    </p:ext>
+  </p:extLst>
 </p:presentation>
 </file>
 
@@ -256,7 +263,7 @@
           <a:p>
             <a:fld id="{84F19DAD-07CF-4ACD-8BE5-EDEADED92C64}" type="datetimeFigureOut">
               <a:rPr lang="en-SG" smtClean="0"/>
-              <a:t>24/9/2018</a:t>
+              <a:t>2/10/2018</a:t>
             </a:fld>
             <a:endParaRPr lang="en-SG"/>
           </a:p>
@@ -456,7 +463,7 @@
           <a:p>
             <a:fld id="{84F19DAD-07CF-4ACD-8BE5-EDEADED92C64}" type="datetimeFigureOut">
               <a:rPr lang="en-SG" smtClean="0"/>
-              <a:t>24/9/2018</a:t>
+              <a:t>2/10/2018</a:t>
             </a:fld>
             <a:endParaRPr lang="en-SG"/>
           </a:p>
@@ -666,7 +673,7 @@
           <a:p>
             <a:fld id="{84F19DAD-07CF-4ACD-8BE5-EDEADED92C64}" type="datetimeFigureOut">
               <a:rPr lang="en-SG" smtClean="0"/>
-              <a:t>24/9/2018</a:t>
+              <a:t>2/10/2018</a:t>
             </a:fld>
             <a:endParaRPr lang="en-SG"/>
           </a:p>
@@ -866,7 +873,7 @@
           <a:p>
             <a:fld id="{84F19DAD-07CF-4ACD-8BE5-EDEADED92C64}" type="datetimeFigureOut">
               <a:rPr lang="en-SG" smtClean="0"/>
-              <a:t>24/9/2018</a:t>
+              <a:t>2/10/2018</a:t>
             </a:fld>
             <a:endParaRPr lang="en-SG"/>
           </a:p>
@@ -1142,7 +1149,7 @@
           <a:p>
             <a:fld id="{84F19DAD-07CF-4ACD-8BE5-EDEADED92C64}" type="datetimeFigureOut">
               <a:rPr lang="en-SG" smtClean="0"/>
-              <a:t>24/9/2018</a:t>
+              <a:t>2/10/2018</a:t>
             </a:fld>
             <a:endParaRPr lang="en-SG"/>
           </a:p>
@@ -1410,7 +1417,7 @@
           <a:p>
             <a:fld id="{84F19DAD-07CF-4ACD-8BE5-EDEADED92C64}" type="datetimeFigureOut">
               <a:rPr lang="en-SG" smtClean="0"/>
-              <a:t>24/9/2018</a:t>
+              <a:t>2/10/2018</a:t>
             </a:fld>
             <a:endParaRPr lang="en-SG"/>
           </a:p>
@@ -1825,7 +1832,7 @@
           <a:p>
             <a:fld id="{84F19DAD-07CF-4ACD-8BE5-EDEADED92C64}" type="datetimeFigureOut">
               <a:rPr lang="en-SG" smtClean="0"/>
-              <a:t>24/9/2018</a:t>
+              <a:t>2/10/2018</a:t>
             </a:fld>
             <a:endParaRPr lang="en-SG"/>
           </a:p>
@@ -1967,7 +1974,7 @@
           <a:p>
             <a:fld id="{84F19DAD-07CF-4ACD-8BE5-EDEADED92C64}" type="datetimeFigureOut">
               <a:rPr lang="en-SG" smtClean="0"/>
-              <a:t>24/9/2018</a:t>
+              <a:t>2/10/2018</a:t>
             </a:fld>
             <a:endParaRPr lang="en-SG"/>
           </a:p>
@@ -2080,7 +2087,7 @@
           <a:p>
             <a:fld id="{84F19DAD-07CF-4ACD-8BE5-EDEADED92C64}" type="datetimeFigureOut">
               <a:rPr lang="en-SG" smtClean="0"/>
-              <a:t>24/9/2018</a:t>
+              <a:t>2/10/2018</a:t>
             </a:fld>
             <a:endParaRPr lang="en-SG"/>
           </a:p>
@@ -2393,7 +2400,7 @@
           <a:p>
             <a:fld id="{84F19DAD-07CF-4ACD-8BE5-EDEADED92C64}" type="datetimeFigureOut">
               <a:rPr lang="en-SG" smtClean="0"/>
-              <a:t>24/9/2018</a:t>
+              <a:t>2/10/2018</a:t>
             </a:fld>
             <a:endParaRPr lang="en-SG"/>
           </a:p>
@@ -2682,7 +2689,7 @@
           <a:p>
             <a:fld id="{84F19DAD-07CF-4ACD-8BE5-EDEADED92C64}" type="datetimeFigureOut">
               <a:rPr lang="en-SG" smtClean="0"/>
-              <a:t>24/9/2018</a:t>
+              <a:t>2/10/2018</a:t>
             </a:fld>
             <a:endParaRPr lang="en-SG"/>
           </a:p>
@@ -2925,7 +2932,7 @@
           <a:p>
             <a:fld id="{84F19DAD-07CF-4ACD-8BE5-EDEADED92C64}" type="datetimeFigureOut">
               <a:rPr lang="en-SG" smtClean="0"/>
-              <a:t>24/9/2018</a:t>
+              <a:t>2/10/2018</a:t>
             </a:fld>
             <a:endParaRPr lang="en-SG"/>
           </a:p>
@@ -3698,6 +3705,1279 @@
 </p:sld>
 </file>
 
+<file path=ppt/slides/slide2.xml><?xml version="1.0" encoding="utf-8"?>
+<p:sld xmlns:a="http://schemas.openxmlformats.org/drawingml/2006/main" xmlns:r="http://schemas.openxmlformats.org/officeDocument/2006/relationships" xmlns:p="http://schemas.openxmlformats.org/presentationml/2006/main">
+  <p:cSld>
+    <p:spTree>
+      <p:nvGrpSpPr>
+        <p:cNvPr id="1" name=""/>
+        <p:cNvGrpSpPr/>
+        <p:nvPr/>
+      </p:nvGrpSpPr>
+      <p:grpSpPr>
+        <a:xfrm>
+          <a:off x="0" y="0"/>
+          <a:ext cx="0" cy="0"/>
+          <a:chOff x="0" y="0"/>
+          <a:chExt cx="0" cy="0"/>
+        </a:xfrm>
+      </p:grpSpPr>
+      <p:pic>
+        <p:nvPicPr>
+          <p:cNvPr id="4" name="Picture 3">
+            <a:extLst>
+              <a:ext uri="{FF2B5EF4-FFF2-40B4-BE49-F238E27FC236}">
+                <a16:creationId xmlns:a16="http://schemas.microsoft.com/office/drawing/2014/main" id="{55222CE7-E05E-4744-825E-6500EAFA30EC}"/>
+              </a:ext>
+            </a:extLst>
+          </p:cNvPr>
+          <p:cNvPicPr>
+            <a:picLocks noChangeAspect="1"/>
+          </p:cNvPicPr>
+          <p:nvPr/>
+        </p:nvPicPr>
+        <p:blipFill>
+          <a:blip r:embed="rId2"/>
+          <a:stretch>
+            <a:fillRect/>
+          </a:stretch>
+        </p:blipFill>
+        <p:spPr>
+          <a:xfrm>
+            <a:off x="0" y="0"/>
+            <a:ext cx="11957538" cy="6858821"/>
+          </a:xfrm>
+          <a:prstGeom prst="rect">
+            <a:avLst/>
+          </a:prstGeom>
+        </p:spPr>
+      </p:pic>
+      <p:sp>
+        <p:nvSpPr>
+          <p:cNvPr id="5" name="Rectangle 4">
+            <a:extLst>
+              <a:ext uri="{FF2B5EF4-FFF2-40B4-BE49-F238E27FC236}">
+                <a16:creationId xmlns:a16="http://schemas.microsoft.com/office/drawing/2014/main" id="{92488842-131B-4F7E-92C8-E6BD7C797896}"/>
+              </a:ext>
+            </a:extLst>
+          </p:cNvPr>
+          <p:cNvSpPr/>
+          <p:nvPr/>
+        </p:nvSpPr>
+        <p:spPr>
+          <a:xfrm>
+            <a:off x="320511" y="2592107"/>
+            <a:ext cx="3045261" cy="1780370"/>
+          </a:xfrm>
+          <a:prstGeom prst="rect">
+            <a:avLst/>
+          </a:prstGeom>
+        </p:spPr>
+        <p:style>
+          <a:lnRef idx="2">
+            <a:schemeClr val="accent1">
+              <a:shade val="50000"/>
+            </a:schemeClr>
+          </a:lnRef>
+          <a:fillRef idx="1">
+            <a:schemeClr val="accent1"/>
+          </a:fillRef>
+          <a:effectRef idx="0">
+            <a:schemeClr val="accent1"/>
+          </a:effectRef>
+          <a:fontRef idx="minor">
+            <a:schemeClr val="lt1"/>
+          </a:fontRef>
+        </p:style>
+        <p:txBody>
+          <a:bodyPr rtlCol="0" anchor="ctr"/>
+          <a:lstStyle/>
+          <a:p>
+            <a:pPr marL="342900" indent="-342900">
+              <a:buAutoNum type="arabicPeriod"/>
+            </a:pPr>
+            <a:r>
+              <a:rPr lang="en-SG" dirty="0">
+                <a:solidFill>
+                  <a:schemeClr val="bg1"/>
+                </a:solidFill>
+              </a:rPr>
+              <a:t>XYZ COMPANY </a:t>
+            </a:r>
+          </a:p>
+          <a:p>
+            <a:r>
+              <a:rPr lang="en-SG" sz="1200" b="1" dirty="0">
+                <a:solidFill>
+                  <a:schemeClr val="bg1">
+                    <a:lumMod val="50000"/>
+                  </a:schemeClr>
+                </a:solidFill>
+                <a:highlight>
+                  <a:srgbClr val="00FFFF"/>
+                </a:highlight>
+              </a:rPr>
+              <a:t>Work</a:t>
+            </a:r>
+            <a:r>
+              <a:rPr lang="en-SG" sz="1200" dirty="0">
+                <a:solidFill>
+                  <a:schemeClr val="bg1"/>
+                </a:solidFill>
+              </a:rPr>
+              <a:t> </a:t>
+            </a:r>
+            <a:r>
+              <a:rPr lang="en-SG" sz="1200" dirty="0">
+                <a:solidFill>
+                  <a:schemeClr val="bg1">
+                    <a:lumMod val="50000"/>
+                  </a:schemeClr>
+                </a:solidFill>
+                <a:highlight>
+                  <a:srgbClr val="00FFFF"/>
+                </a:highlight>
+              </a:rPr>
+              <a:t>AI</a:t>
+            </a:r>
+            <a:r>
+              <a:rPr lang="en-SG" sz="1200" dirty="0">
+                <a:solidFill>
+                  <a:schemeClr val="bg1"/>
+                </a:solidFill>
+              </a:rPr>
+              <a:t> </a:t>
+            </a:r>
+            <a:r>
+              <a:rPr lang="en-SG" sz="1200" dirty="0">
+                <a:solidFill>
+                  <a:schemeClr val="bg1">
+                    <a:lumMod val="50000"/>
+                  </a:schemeClr>
+                </a:solidFill>
+                <a:highlight>
+                  <a:srgbClr val="00FFFF"/>
+                </a:highlight>
+              </a:rPr>
+              <a:t>SE</a:t>
+            </a:r>
+          </a:p>
+          <a:p>
+            <a:r>
+              <a:rPr lang="en-SG" sz="1200" dirty="0">
+                <a:solidFill>
+                  <a:schemeClr val="bg1"/>
+                </a:solidFill>
+              </a:rPr>
+              <a:t>SOFTWARE ENGINEER INTERN</a:t>
+            </a:r>
+          </a:p>
+          <a:p>
+            <a:r>
+              <a:rPr lang="en-SG" sz="1200" dirty="0">
+                <a:solidFill>
+                  <a:schemeClr val="bg1"/>
+                </a:solidFill>
+              </a:rPr>
+              <a:t>DEC 2010 – DEC 2018</a:t>
+            </a:r>
+          </a:p>
+          <a:p>
+            <a:pPr marL="285750" lvl="0" indent="-285750">
+              <a:buFont typeface="Arial" panose="020B0604020202020204" pitchFamily="34" charset="0"/>
+              <a:buChar char="•"/>
+            </a:pPr>
+            <a:r>
+              <a:rPr lang="en-US" sz="1200" dirty="0"/>
+              <a:t>Research design and implement scalable application</a:t>
+            </a:r>
+            <a:endParaRPr lang="en-SG" sz="1200" dirty="0"/>
+          </a:p>
+          <a:p>
+            <a:pPr marL="285750" lvl="0" indent="-285750">
+              <a:buFont typeface="Arial" panose="020B0604020202020204" pitchFamily="34" charset="0"/>
+              <a:buChar char="•"/>
+            </a:pPr>
+            <a:r>
+              <a:rPr lang="en-US" sz="1200" dirty="0"/>
+              <a:t>Evaluate interface between hardware and software</a:t>
+            </a:r>
+          </a:p>
+          <a:p>
+            <a:pPr marL="285750" lvl="0" indent="-285750">
+              <a:buFont typeface="Arial" panose="020B0604020202020204" pitchFamily="34" charset="0"/>
+              <a:buChar char="•"/>
+            </a:pPr>
+            <a:r>
+              <a:rPr lang="en-US" sz="1200" dirty="0"/>
+              <a:t>Implementing AI models</a:t>
+            </a:r>
+            <a:endParaRPr lang="en-SG" sz="1200" dirty="0">
+              <a:solidFill>
+                <a:schemeClr val="bg1"/>
+              </a:solidFill>
+            </a:endParaRPr>
+          </a:p>
+        </p:txBody>
+      </p:sp>
+      <p:sp>
+        <p:nvSpPr>
+          <p:cNvPr id="9" name="Rectangle 8">
+            <a:extLst>
+              <a:ext uri="{FF2B5EF4-FFF2-40B4-BE49-F238E27FC236}">
+                <a16:creationId xmlns:a16="http://schemas.microsoft.com/office/drawing/2014/main" id="{7DC2AC52-837F-4D5C-AF0B-138AE25A597B}"/>
+              </a:ext>
+            </a:extLst>
+          </p:cNvPr>
+          <p:cNvSpPr/>
+          <p:nvPr/>
+        </p:nvSpPr>
+        <p:spPr>
+          <a:xfrm>
+            <a:off x="320511" y="4542061"/>
+            <a:ext cx="3045261" cy="1322408"/>
+          </a:xfrm>
+          <a:prstGeom prst="rect">
+            <a:avLst/>
+          </a:prstGeom>
+        </p:spPr>
+        <p:style>
+          <a:lnRef idx="2">
+            <a:schemeClr val="accent1">
+              <a:shade val="50000"/>
+            </a:schemeClr>
+          </a:lnRef>
+          <a:fillRef idx="1">
+            <a:schemeClr val="accent1"/>
+          </a:fillRef>
+          <a:effectRef idx="0">
+            <a:schemeClr val="accent1"/>
+          </a:effectRef>
+          <a:fontRef idx="minor">
+            <a:schemeClr val="lt1"/>
+          </a:fontRef>
+        </p:style>
+        <p:txBody>
+          <a:bodyPr rtlCol="0" anchor="t"/>
+          <a:lstStyle/>
+          <a:p>
+            <a:r>
+              <a:rPr lang="en-SG" dirty="0">
+                <a:solidFill>
+                  <a:schemeClr val="bg1"/>
+                </a:solidFill>
+              </a:rPr>
+              <a:t>2. THE SOURCE ACADEMY </a:t>
+            </a:r>
+          </a:p>
+          <a:p>
+            <a:r>
+              <a:rPr lang="en-SG" sz="1200" b="1" dirty="0">
+                <a:solidFill>
+                  <a:schemeClr val="bg1">
+                    <a:lumMod val="50000"/>
+                  </a:schemeClr>
+                </a:solidFill>
+                <a:highlight>
+                  <a:srgbClr val="00FFFF"/>
+                </a:highlight>
+              </a:rPr>
+              <a:t>Education</a:t>
+            </a:r>
+            <a:r>
+              <a:rPr lang="en-SG" sz="1200" dirty="0">
+                <a:solidFill>
+                  <a:schemeClr val="bg1"/>
+                </a:solidFill>
+              </a:rPr>
+              <a:t>  </a:t>
+            </a:r>
+            <a:r>
+              <a:rPr lang="en-SG" sz="1200" dirty="0">
+                <a:solidFill>
+                  <a:schemeClr val="bg1">
+                    <a:lumMod val="50000"/>
+                  </a:schemeClr>
+                </a:solidFill>
+                <a:highlight>
+                  <a:srgbClr val="00FFFF"/>
+                </a:highlight>
+              </a:rPr>
+              <a:t>Uni</a:t>
+            </a:r>
+            <a:r>
+              <a:rPr lang="en-SG" sz="1200" b="1" dirty="0">
+                <a:solidFill>
+                  <a:schemeClr val="bg1">
+                    <a:lumMod val="50000"/>
+                  </a:schemeClr>
+                </a:solidFill>
+                <a:highlight>
+                  <a:srgbClr val="00FFFF"/>
+                </a:highlight>
+              </a:rPr>
+              <a:t> </a:t>
+            </a:r>
+          </a:p>
+          <a:p>
+            <a:r>
+              <a:rPr lang="en-SG" sz="1200" dirty="0">
+                <a:solidFill>
+                  <a:schemeClr val="bg1"/>
+                </a:solidFill>
+              </a:rPr>
+              <a:t>BACHELOR OF COMPUTING (HONOURS)</a:t>
+            </a:r>
+          </a:p>
+          <a:p>
+            <a:r>
+              <a:rPr lang="en-SG" sz="1200" dirty="0">
+                <a:solidFill>
+                  <a:schemeClr val="bg1"/>
+                </a:solidFill>
+              </a:rPr>
+              <a:t>JAN 2006 – MAY 2010</a:t>
+            </a:r>
+          </a:p>
+          <a:p>
+            <a:pPr marL="285750" lvl="0" indent="-285750">
+              <a:buFont typeface="Arial" panose="020B0604020202020204" pitchFamily="34" charset="0"/>
+              <a:buChar char="•"/>
+            </a:pPr>
+            <a:r>
+              <a:rPr lang="en-SG" sz="1200" dirty="0">
+                <a:solidFill>
+                  <a:schemeClr val="bg1"/>
+                </a:solidFill>
+              </a:rPr>
+              <a:t>Graduated with First Class Honours</a:t>
+            </a:r>
+          </a:p>
+          <a:p>
+            <a:pPr marL="285750" lvl="0" indent="-285750">
+              <a:buFont typeface="Arial" panose="020B0604020202020204" pitchFamily="34" charset="0"/>
+              <a:buChar char="•"/>
+            </a:pPr>
+            <a:r>
+              <a:rPr lang="en-SG" sz="1200" dirty="0">
+                <a:solidFill>
+                  <a:schemeClr val="bg1"/>
+                </a:solidFill>
+              </a:rPr>
+              <a:t>Dean’s List for AY07/08 Semester 1</a:t>
+            </a:r>
+          </a:p>
+        </p:txBody>
+      </p:sp>
+      <p:sp>
+        <p:nvSpPr>
+          <p:cNvPr id="2" name="TextBox 1">
+            <a:extLst>
+              <a:ext uri="{FF2B5EF4-FFF2-40B4-BE49-F238E27FC236}">
+                <a16:creationId xmlns:a16="http://schemas.microsoft.com/office/drawing/2014/main" id="{FCC2E8FD-1011-4B25-A4F1-9D0B162DB2D1}"/>
+              </a:ext>
+            </a:extLst>
+          </p:cNvPr>
+          <p:cNvSpPr txBox="1"/>
+          <p:nvPr/>
+        </p:nvSpPr>
+        <p:spPr>
+          <a:xfrm>
+            <a:off x="234462" y="35560"/>
+            <a:ext cx="1096497" cy="261610"/>
+          </a:xfrm>
+          <a:prstGeom prst="rect">
+            <a:avLst/>
+          </a:prstGeom>
+          <a:solidFill>
+            <a:schemeClr val="bg1"/>
+          </a:solidFill>
+        </p:spPr>
+        <p:txBody>
+          <a:bodyPr wrap="square" lIns="36000" rtlCol="0">
+            <a:spAutoFit/>
+          </a:bodyPr>
+          <a:lstStyle/>
+          <a:p>
+            <a:r>
+              <a:rPr lang="en-SG" sz="1100" dirty="0" err="1">
+                <a:latin typeface="Segoe UI" panose="020B0502040204020203" pitchFamily="34" charset="0"/>
+                <a:cs typeface="Segoe UI" panose="020B0502040204020203" pitchFamily="34" charset="0"/>
+              </a:rPr>
+              <a:t>ResuMaker</a:t>
+            </a:r>
+            <a:endParaRPr lang="en-SG" sz="1100" dirty="0">
+              <a:latin typeface="Segoe UI" panose="020B0502040204020203" pitchFamily="34" charset="0"/>
+              <a:cs typeface="Segoe UI" panose="020B0502040204020203" pitchFamily="34" charset="0"/>
+            </a:endParaRPr>
+          </a:p>
+        </p:txBody>
+      </p:sp>
+      <p:sp>
+        <p:nvSpPr>
+          <p:cNvPr id="7" name="Rectangle 6">
+            <a:extLst>
+              <a:ext uri="{FF2B5EF4-FFF2-40B4-BE49-F238E27FC236}">
+                <a16:creationId xmlns:a16="http://schemas.microsoft.com/office/drawing/2014/main" id="{797D555E-60FB-44E3-9AEE-B157BB0719FA}"/>
+              </a:ext>
+            </a:extLst>
+          </p:cNvPr>
+          <p:cNvSpPr/>
+          <p:nvPr/>
+        </p:nvSpPr>
+        <p:spPr>
+          <a:xfrm>
+            <a:off x="320511" y="6034053"/>
+            <a:ext cx="3045261" cy="366747"/>
+          </a:xfrm>
+          <a:prstGeom prst="rect">
+            <a:avLst/>
+          </a:prstGeom>
+        </p:spPr>
+        <p:style>
+          <a:lnRef idx="2">
+            <a:schemeClr val="accent1">
+              <a:shade val="50000"/>
+            </a:schemeClr>
+          </a:lnRef>
+          <a:fillRef idx="1">
+            <a:schemeClr val="accent1"/>
+          </a:fillRef>
+          <a:effectRef idx="0">
+            <a:schemeClr val="accent1"/>
+          </a:effectRef>
+          <a:fontRef idx="minor">
+            <a:schemeClr val="lt1"/>
+          </a:fontRef>
+        </p:style>
+        <p:txBody>
+          <a:bodyPr rtlCol="0" anchor="t"/>
+          <a:lstStyle/>
+          <a:p>
+            <a:r>
+              <a:rPr lang="en-SG" dirty="0">
+                <a:solidFill>
+                  <a:schemeClr val="bg1"/>
+                </a:solidFill>
+              </a:rPr>
+              <a:t>3. ABC Studios</a:t>
+            </a:r>
+          </a:p>
+        </p:txBody>
+      </p:sp>
+      <p:pic>
+        <p:nvPicPr>
+          <p:cNvPr id="11" name="Picture 10">
+            <a:extLst>
+              <a:ext uri="{FF2B5EF4-FFF2-40B4-BE49-F238E27FC236}">
+                <a16:creationId xmlns:a16="http://schemas.microsoft.com/office/drawing/2014/main" id="{98ED7633-C36F-4A78-8124-8114468003AF}"/>
+              </a:ext>
+            </a:extLst>
+          </p:cNvPr>
+          <p:cNvPicPr>
+            <a:picLocks noChangeAspect="1"/>
+          </p:cNvPicPr>
+          <p:nvPr/>
+        </p:nvPicPr>
+        <p:blipFill>
+          <a:blip r:embed="rId3"/>
+          <a:stretch>
+            <a:fillRect/>
+          </a:stretch>
+        </p:blipFill>
+        <p:spPr>
+          <a:xfrm>
+            <a:off x="4992198" y="2524858"/>
+            <a:ext cx="4978279" cy="3942863"/>
+          </a:xfrm>
+          <a:prstGeom prst="rect">
+            <a:avLst/>
+          </a:prstGeom>
+        </p:spPr>
+      </p:pic>
+      <p:sp>
+        <p:nvSpPr>
+          <p:cNvPr id="12" name="TextBox 11">
+            <a:extLst>
+              <a:ext uri="{FF2B5EF4-FFF2-40B4-BE49-F238E27FC236}">
+                <a16:creationId xmlns:a16="http://schemas.microsoft.com/office/drawing/2014/main" id="{C553AAAC-F5C9-4BE9-8CAC-7148674A95D0}"/>
+              </a:ext>
+            </a:extLst>
+          </p:cNvPr>
+          <p:cNvSpPr txBox="1"/>
+          <p:nvPr/>
+        </p:nvSpPr>
+        <p:spPr>
+          <a:xfrm>
+            <a:off x="128762" y="905607"/>
+            <a:ext cx="3045261" cy="307777"/>
+          </a:xfrm>
+          <a:prstGeom prst="rect">
+            <a:avLst/>
+          </a:prstGeom>
+          <a:solidFill>
+            <a:srgbClr val="383838"/>
+          </a:solidFill>
+        </p:spPr>
+        <p:txBody>
+          <a:bodyPr wrap="square" rtlCol="0">
+            <a:spAutoFit/>
+          </a:bodyPr>
+          <a:lstStyle/>
+          <a:p>
+            <a:r>
+              <a:rPr lang="en-SG" sz="1400" dirty="0">
+                <a:solidFill>
+                  <a:schemeClr val="bg1">
+                    <a:lumMod val="50000"/>
+                  </a:schemeClr>
+                </a:solidFill>
+                <a:latin typeface="Segoe UI" panose="020B0502040204020203" pitchFamily="34" charset="0"/>
+                <a:cs typeface="Segoe UI" panose="020B0502040204020203" pitchFamily="34" charset="0"/>
+              </a:rPr>
+              <a:t>Enter command here…</a:t>
+            </a:r>
+          </a:p>
+        </p:txBody>
+      </p:sp>
+      <p:sp>
+        <p:nvSpPr>
+          <p:cNvPr id="13" name="TextBox 12">
+            <a:extLst>
+              <a:ext uri="{FF2B5EF4-FFF2-40B4-BE49-F238E27FC236}">
+                <a16:creationId xmlns:a16="http://schemas.microsoft.com/office/drawing/2014/main" id="{B3DC791A-1CFD-4A02-BD70-F03FB256CCF9}"/>
+              </a:ext>
+            </a:extLst>
+          </p:cNvPr>
+          <p:cNvSpPr txBox="1"/>
+          <p:nvPr/>
+        </p:nvSpPr>
+        <p:spPr>
+          <a:xfrm>
+            <a:off x="10313378" y="6556820"/>
+            <a:ext cx="1740876" cy="292388"/>
+          </a:xfrm>
+          <a:prstGeom prst="rect">
+            <a:avLst/>
+          </a:prstGeom>
+          <a:solidFill>
+            <a:srgbClr val="454545"/>
+          </a:solidFill>
+        </p:spPr>
+        <p:txBody>
+          <a:bodyPr wrap="square" rtlCol="0">
+            <a:spAutoFit/>
+          </a:bodyPr>
+          <a:lstStyle/>
+          <a:p>
+            <a:r>
+              <a:rPr lang="en-SG" sz="1300" dirty="0">
+                <a:solidFill>
+                  <a:schemeClr val="bg1">
+                    <a:lumMod val="75000"/>
+                  </a:schemeClr>
+                </a:solidFill>
+                <a:latin typeface="Segoe UI" panose="020B0502040204020203" pitchFamily="34" charset="0"/>
+                <a:cs typeface="Segoe UI" panose="020B0502040204020203" pitchFamily="34" charset="0"/>
+              </a:rPr>
+              <a:t>.\data\entrybook.xml</a:t>
+            </a:r>
+          </a:p>
+        </p:txBody>
+      </p:sp>
+    </p:spTree>
+    <p:extLst>
+      <p:ext uri="{BB962C8B-B14F-4D97-AF65-F5344CB8AC3E}">
+        <p14:creationId xmlns:p14="http://schemas.microsoft.com/office/powerpoint/2010/main" val="2182096713"/>
+      </p:ext>
+    </p:extLst>
+  </p:cSld>
+  <p:clrMapOvr>
+    <a:masterClrMapping/>
+  </p:clrMapOvr>
+</p:sld>
+</file>
+
+<file path=ppt/slides/slide3.xml><?xml version="1.0" encoding="utf-8"?>
+<p:sld xmlns:a="http://schemas.openxmlformats.org/drawingml/2006/main" xmlns:r="http://schemas.openxmlformats.org/officeDocument/2006/relationships" xmlns:p="http://schemas.openxmlformats.org/presentationml/2006/main">
+  <p:cSld>
+    <p:spTree>
+      <p:nvGrpSpPr>
+        <p:cNvPr id="1" name=""/>
+        <p:cNvGrpSpPr/>
+        <p:nvPr/>
+      </p:nvGrpSpPr>
+      <p:grpSpPr>
+        <a:xfrm>
+          <a:off x="0" y="0"/>
+          <a:ext cx="0" cy="0"/>
+          <a:chOff x="0" y="0"/>
+          <a:chExt cx="0" cy="0"/>
+        </a:xfrm>
+      </p:grpSpPr>
+      <p:sp>
+        <p:nvSpPr>
+          <p:cNvPr id="4" name="Rectangle 3">
+            <a:extLst>
+              <a:ext uri="{FF2B5EF4-FFF2-40B4-BE49-F238E27FC236}">
+                <a16:creationId xmlns:a16="http://schemas.microsoft.com/office/drawing/2014/main" id="{CF0C6653-E811-4E7C-B4D3-6AA7A5BE9FCD}"/>
+              </a:ext>
+            </a:extLst>
+          </p:cNvPr>
+          <p:cNvSpPr/>
+          <p:nvPr/>
+        </p:nvSpPr>
+        <p:spPr>
+          <a:xfrm>
+            <a:off x="1626577" y="880523"/>
+            <a:ext cx="8088923" cy="5612352"/>
+          </a:xfrm>
+          <a:prstGeom prst="rect">
+            <a:avLst/>
+          </a:prstGeom>
+          <a:solidFill>
+            <a:srgbClr val="383838"/>
+          </a:solidFill>
+        </p:spPr>
+        <p:style>
+          <a:lnRef idx="2">
+            <a:schemeClr val="accent1">
+              <a:shade val="50000"/>
+            </a:schemeClr>
+          </a:lnRef>
+          <a:fillRef idx="1">
+            <a:schemeClr val="accent1"/>
+          </a:fillRef>
+          <a:effectRef idx="0">
+            <a:schemeClr val="accent1"/>
+          </a:effectRef>
+          <a:fontRef idx="minor">
+            <a:schemeClr val="lt1"/>
+          </a:fontRef>
+        </p:style>
+        <p:txBody>
+          <a:bodyPr rtlCol="0" anchor="ctr"/>
+          <a:lstStyle/>
+          <a:p>
+            <a:pPr algn="ctr"/>
+            <a:endParaRPr lang="en-SG"/>
+          </a:p>
+        </p:txBody>
+      </p:sp>
+      <p:graphicFrame>
+        <p:nvGraphicFramePr>
+          <p:cNvPr id="9" name="Table 8">
+            <a:extLst>
+              <a:ext uri="{FF2B5EF4-FFF2-40B4-BE49-F238E27FC236}">
+                <a16:creationId xmlns:a16="http://schemas.microsoft.com/office/drawing/2014/main" id="{35D8C9CB-CEFA-4373-AB54-F69DF5523D26}"/>
+              </a:ext>
+            </a:extLst>
+          </p:cNvPr>
+          <p:cNvGraphicFramePr>
+            <a:graphicFrameLocks noGrp="1"/>
+          </p:cNvGraphicFramePr>
+          <p:nvPr/>
+        </p:nvGraphicFramePr>
+        <p:xfrm>
+          <a:off x="3847147" y="2325116"/>
+          <a:ext cx="4497705" cy="3352356"/>
+        </p:xfrm>
+        <a:graphic>
+          <a:graphicData uri="http://schemas.openxmlformats.org/drawingml/2006/table">
+            <a:tbl>
+              <a:tblPr firstRow="1" firstCol="1" bandRow="1"/>
+              <a:tblGrid>
+                <a:gridCol w="4497705">
+                  <a:extLst>
+                    <a:ext uri="{9D8B030D-6E8A-4147-A177-3AD203B41FA5}">
+                      <a16:colId xmlns:a16="http://schemas.microsoft.com/office/drawing/2014/main" val="2508148749"/>
+                    </a:ext>
+                  </a:extLst>
+                </a:gridCol>
+              </a:tblGrid>
+              <a:tr h="129540">
+                <a:tc>
+                  <a:txBody>
+                    <a:bodyPr/>
+                    <a:lstStyle/>
+                    <a:p>
+                      <a:pPr algn="ctr">
+                        <a:lnSpc>
+                          <a:spcPct val="107000"/>
+                        </a:lnSpc>
+                        <a:spcAft>
+                          <a:spcPts val="0"/>
+                        </a:spcAft>
+                      </a:pPr>
+                      <a:r>
+                        <a:rPr lang="en-SG" sz="1400">
+                          <a:solidFill>
+                            <a:srgbClr val="FFFFFF"/>
+                          </a:solidFill>
+                          <a:effectLst/>
+                          <a:latin typeface="Segoe UI" panose="020B0502040204020203" pitchFamily="34" charset="0"/>
+                          <a:ea typeface="DengXian" panose="02010600030101010101" pitchFamily="2" charset="-122"/>
+                          <a:cs typeface="Times New Roman" panose="02020603050405020304" pitchFamily="18" charset="0"/>
+                        </a:rPr>
+                        <a:t>template.txt</a:t>
+                      </a:r>
+                      <a:endParaRPr lang="en-SG" sz="1100">
+                        <a:effectLst/>
+                        <a:latin typeface="Calibri" panose="020F0502020204030204" pitchFamily="34" charset="0"/>
+                        <a:ea typeface="DengXian" panose="02010600030101010101" pitchFamily="2" charset="-122"/>
+                        <a:cs typeface="Times New Roman" panose="02020603050405020304" pitchFamily="18" charset="0"/>
+                      </a:endParaRPr>
+                    </a:p>
+                  </a:txBody>
+                  <a:tcPr marL="68580" marR="68580" marT="0" marB="0">
+                    <a:lnL w="12700" cap="flat" cmpd="sng" algn="ctr">
+                      <a:solidFill>
+                        <a:srgbClr val="FFFFFF"/>
+                      </a:solidFill>
+                      <a:prstDash val="solid"/>
+                      <a:round/>
+                      <a:headEnd type="none" w="med" len="med"/>
+                      <a:tailEnd type="none" w="med" len="med"/>
+                    </a:lnL>
+                    <a:lnR w="12700" cap="flat" cmpd="sng" algn="ctr">
+                      <a:solidFill>
+                        <a:srgbClr val="FFFFFF"/>
+                      </a:solidFill>
+                      <a:prstDash val="solid"/>
+                      <a:round/>
+                      <a:headEnd type="none" w="med" len="med"/>
+                      <a:tailEnd type="none" w="med" len="med"/>
+                    </a:lnR>
+                    <a:lnT w="12700" cap="flat" cmpd="sng" algn="ctr">
+                      <a:solidFill>
+                        <a:srgbClr val="FFFFFF"/>
+                      </a:solidFill>
+                      <a:prstDash val="solid"/>
+                      <a:round/>
+                      <a:headEnd type="none" w="med" len="med"/>
+                      <a:tailEnd type="none" w="med" len="med"/>
+                    </a:lnT>
+                    <a:lnB w="12700" cap="flat" cmpd="sng" algn="ctr">
+                      <a:solidFill>
+                        <a:srgbClr val="FFFFFF"/>
+                      </a:solidFill>
+                      <a:prstDash val="solid"/>
+                      <a:round/>
+                      <a:headEnd type="none" w="med" len="med"/>
+                      <a:tailEnd type="none" w="med" len="med"/>
+                    </a:lnB>
+                    <a:solidFill>
+                      <a:srgbClr val="808080"/>
+                    </a:solidFill>
+                  </a:tcPr>
+                </a:tc>
+                <a:extLst>
+                  <a:ext uri="{0D108BD9-81ED-4DB2-BD59-A6C34878D82A}">
+                    <a16:rowId xmlns:a16="http://schemas.microsoft.com/office/drawing/2014/main" val="840550265"/>
+                  </a:ext>
+                </a:extLst>
+              </a:tr>
+              <a:tr h="956310">
+                <a:tc>
+                  <a:txBody>
+                    <a:bodyPr/>
+                    <a:lstStyle/>
+                    <a:p>
+                      <a:pPr algn="l">
+                        <a:lnSpc>
+                          <a:spcPct val="107000"/>
+                        </a:lnSpc>
+                        <a:spcAft>
+                          <a:spcPts val="0"/>
+                        </a:spcAft>
+                      </a:pPr>
+                      <a:r>
+                        <a:rPr lang="en-SG" sz="1400" b="1" dirty="0">
+                          <a:solidFill>
+                            <a:srgbClr val="FFFFFF"/>
+                          </a:solidFill>
+                          <a:effectLst/>
+                          <a:latin typeface="Segoe UI" panose="020B0502040204020203" pitchFamily="34" charset="0"/>
+                          <a:ea typeface="DengXian" panose="02010600030101010101" pitchFamily="2" charset="-122"/>
+                          <a:cs typeface="Times New Roman" panose="02020603050405020304" pitchFamily="18" charset="0"/>
+                        </a:rPr>
+                        <a:t>Personal Particulars</a:t>
+                      </a:r>
+                      <a:r>
+                        <a:rPr lang="en-SG" sz="1400" dirty="0">
+                          <a:solidFill>
+                            <a:srgbClr val="FFFFFF"/>
+                          </a:solidFill>
+                          <a:effectLst/>
+                          <a:latin typeface="Segoe UI" panose="020B0502040204020203" pitchFamily="34" charset="0"/>
+                          <a:ea typeface="DengXian" panose="02010600030101010101" pitchFamily="2" charset="-122"/>
+                          <a:cs typeface="Times New Roman" panose="02020603050405020304" pitchFamily="18" charset="0"/>
+                        </a:rPr>
+                        <a:t> ~info</a:t>
+                      </a:r>
+                      <a:br>
+                        <a:rPr lang="en-SG" sz="1400" b="1" dirty="0">
+                          <a:solidFill>
+                            <a:srgbClr val="FFFFFF"/>
+                          </a:solidFill>
+                          <a:effectLst/>
+                          <a:latin typeface="Segoe UI" panose="020B0502040204020203" pitchFamily="34" charset="0"/>
+                          <a:ea typeface="DengXian" panose="02010600030101010101" pitchFamily="2" charset="-122"/>
+                          <a:cs typeface="Times New Roman" panose="02020603050405020304" pitchFamily="18" charset="0"/>
+                        </a:rPr>
+                      </a:br>
+                      <a:endParaRPr lang="en-SG" sz="1100" dirty="0">
+                        <a:effectLst/>
+                        <a:latin typeface="Calibri" panose="020F0502020204030204" pitchFamily="34" charset="0"/>
+                        <a:ea typeface="DengXian" panose="02010600030101010101" pitchFamily="2" charset="-122"/>
+                        <a:cs typeface="Times New Roman" panose="02020603050405020304" pitchFamily="18" charset="0"/>
+                      </a:endParaRPr>
+                    </a:p>
+                    <a:p>
+                      <a:pPr algn="l">
+                        <a:lnSpc>
+                          <a:spcPct val="107000"/>
+                        </a:lnSpc>
+                        <a:spcAft>
+                          <a:spcPts val="0"/>
+                        </a:spcAft>
+                      </a:pPr>
+                      <a:r>
+                        <a:rPr lang="en-SG" sz="1400" b="1" dirty="0">
+                          <a:solidFill>
+                            <a:srgbClr val="FFFFFF"/>
+                          </a:solidFill>
+                          <a:effectLst/>
+                          <a:latin typeface="Segoe UI" panose="020B0502040204020203" pitchFamily="34" charset="0"/>
+                          <a:ea typeface="DengXian" panose="02010600030101010101" pitchFamily="2" charset="-122"/>
+                          <a:cs typeface="Times New Roman" panose="02020603050405020304" pitchFamily="18" charset="0"/>
+                        </a:rPr>
+                        <a:t>Work Experience </a:t>
+                      </a:r>
+                      <a:r>
+                        <a:rPr lang="en-SG" sz="1400" dirty="0">
+                          <a:solidFill>
+                            <a:srgbClr val="FFFFFF"/>
+                          </a:solidFill>
+                          <a:effectLst/>
+                          <a:latin typeface="Segoe UI" panose="020B0502040204020203" pitchFamily="34" charset="0"/>
+                          <a:ea typeface="DengXian" panose="02010600030101010101" pitchFamily="2" charset="-122"/>
+                          <a:cs typeface="Times New Roman" panose="02020603050405020304" pitchFamily="18" charset="0"/>
+                        </a:rPr>
+                        <a:t>~work</a:t>
+                      </a:r>
+                      <a:br>
+                        <a:rPr lang="en-SG" sz="1400" dirty="0">
+                          <a:solidFill>
+                            <a:srgbClr val="FFFFFF"/>
+                          </a:solidFill>
+                          <a:effectLst/>
+                          <a:latin typeface="Segoe UI" panose="020B0502040204020203" pitchFamily="34" charset="0"/>
+                          <a:ea typeface="DengXian" panose="02010600030101010101" pitchFamily="2" charset="-122"/>
+                          <a:cs typeface="Times New Roman" panose="02020603050405020304" pitchFamily="18" charset="0"/>
+                        </a:rPr>
+                      </a:br>
+                      <a:r>
+                        <a:rPr lang="en-SG" sz="1400" dirty="0">
+                          <a:solidFill>
+                            <a:srgbClr val="FFFFFF"/>
+                          </a:solidFill>
+                          <a:effectLst/>
+                          <a:latin typeface="Segoe UI" panose="020B0502040204020203" pitchFamily="34" charset="0"/>
+                          <a:ea typeface="DengXian" panose="02010600030101010101" pitchFamily="2" charset="-122"/>
+                          <a:cs typeface="Times New Roman" panose="02020603050405020304" pitchFamily="18" charset="0"/>
+                        </a:rPr>
+                        <a:t>#AI #SE #Web</a:t>
+                      </a:r>
+                      <a:endParaRPr lang="en-SG" sz="1100" dirty="0">
+                        <a:effectLst/>
+                        <a:latin typeface="Calibri" panose="020F0502020204030204" pitchFamily="34" charset="0"/>
+                        <a:ea typeface="DengXian" panose="02010600030101010101" pitchFamily="2" charset="-122"/>
+                        <a:cs typeface="Times New Roman" panose="02020603050405020304" pitchFamily="18" charset="0"/>
+                      </a:endParaRPr>
+                    </a:p>
+                    <a:p>
+                      <a:pPr algn="l">
+                        <a:lnSpc>
+                          <a:spcPct val="107000"/>
+                        </a:lnSpc>
+                        <a:spcAft>
+                          <a:spcPts val="0"/>
+                        </a:spcAft>
+                      </a:pPr>
+                      <a:r>
+                        <a:rPr lang="en-SG" sz="1400" b="1" dirty="0">
+                          <a:solidFill>
+                            <a:srgbClr val="FFFFFF"/>
+                          </a:solidFill>
+                          <a:effectLst/>
+                          <a:latin typeface="Segoe UI" panose="020B0502040204020203" pitchFamily="34" charset="0"/>
+                          <a:ea typeface="DengXian" panose="02010600030101010101" pitchFamily="2" charset="-122"/>
+                          <a:cs typeface="Times New Roman" panose="02020603050405020304" pitchFamily="18" charset="0"/>
+                        </a:rPr>
+                        <a:t> </a:t>
+                      </a:r>
+                      <a:endParaRPr lang="en-SG" sz="1100" dirty="0">
+                        <a:effectLst/>
+                        <a:latin typeface="Calibri" panose="020F0502020204030204" pitchFamily="34" charset="0"/>
+                        <a:ea typeface="DengXian" panose="02010600030101010101" pitchFamily="2" charset="-122"/>
+                        <a:cs typeface="Times New Roman" panose="02020603050405020304" pitchFamily="18" charset="0"/>
+                      </a:endParaRPr>
+                    </a:p>
+                    <a:p>
+                      <a:pPr algn="l">
+                        <a:lnSpc>
+                          <a:spcPct val="107000"/>
+                        </a:lnSpc>
+                        <a:spcAft>
+                          <a:spcPts val="0"/>
+                        </a:spcAft>
+                      </a:pPr>
+                      <a:r>
+                        <a:rPr lang="en-SG" sz="1400" b="1" dirty="0">
+                          <a:solidFill>
+                            <a:srgbClr val="FFFFFF"/>
+                          </a:solidFill>
+                          <a:effectLst/>
+                          <a:latin typeface="Segoe UI" panose="020B0502040204020203" pitchFamily="34" charset="0"/>
+                          <a:ea typeface="DengXian" panose="02010600030101010101" pitchFamily="2" charset="-122"/>
+                          <a:cs typeface="Times New Roman" panose="02020603050405020304" pitchFamily="18" charset="0"/>
+                        </a:rPr>
+                        <a:t>Education </a:t>
+                      </a:r>
+                      <a:r>
+                        <a:rPr lang="en-SG" sz="1400" dirty="0">
+                          <a:solidFill>
+                            <a:srgbClr val="FFFFFF"/>
+                          </a:solidFill>
+                          <a:effectLst/>
+                          <a:latin typeface="Segoe UI" panose="020B0502040204020203" pitchFamily="34" charset="0"/>
+                          <a:ea typeface="DengXian" panose="02010600030101010101" pitchFamily="2" charset="-122"/>
+                          <a:cs typeface="Times New Roman" panose="02020603050405020304" pitchFamily="18" charset="0"/>
+                        </a:rPr>
+                        <a:t>~education</a:t>
+                      </a:r>
+                      <a:endParaRPr lang="en-SG" sz="1100" dirty="0">
+                        <a:effectLst/>
+                        <a:latin typeface="Calibri" panose="020F0502020204030204" pitchFamily="34" charset="0"/>
+                        <a:ea typeface="DengXian" panose="02010600030101010101" pitchFamily="2" charset="-122"/>
+                        <a:cs typeface="Times New Roman" panose="02020603050405020304" pitchFamily="18" charset="0"/>
+                      </a:endParaRPr>
+                    </a:p>
+                    <a:p>
+                      <a:pPr algn="l">
+                        <a:lnSpc>
+                          <a:spcPct val="107000"/>
+                        </a:lnSpc>
+                        <a:spcAft>
+                          <a:spcPts val="0"/>
+                        </a:spcAft>
+                      </a:pPr>
+                      <a:r>
+                        <a:rPr lang="en-SG" sz="1400" dirty="0">
+                          <a:solidFill>
+                            <a:srgbClr val="FFFFFF"/>
+                          </a:solidFill>
+                          <a:effectLst/>
+                          <a:latin typeface="Segoe UI" panose="020B0502040204020203" pitchFamily="34" charset="0"/>
+                          <a:ea typeface="DengXian" panose="02010600030101010101" pitchFamily="2" charset="-122"/>
+                          <a:cs typeface="Times New Roman" panose="02020603050405020304" pitchFamily="18" charset="0"/>
+                        </a:rPr>
+                        <a:t>#Uni</a:t>
+                      </a:r>
+                      <a:endParaRPr lang="en-SG" sz="1100" dirty="0">
+                        <a:effectLst/>
+                        <a:latin typeface="Calibri" panose="020F0502020204030204" pitchFamily="34" charset="0"/>
+                        <a:ea typeface="DengXian" panose="02010600030101010101" pitchFamily="2" charset="-122"/>
+                        <a:cs typeface="Times New Roman" panose="02020603050405020304" pitchFamily="18" charset="0"/>
+                      </a:endParaRPr>
+                    </a:p>
+                    <a:p>
+                      <a:pPr algn="l">
+                        <a:lnSpc>
+                          <a:spcPct val="107000"/>
+                        </a:lnSpc>
+                        <a:spcAft>
+                          <a:spcPts val="0"/>
+                        </a:spcAft>
+                      </a:pPr>
+                      <a:r>
+                        <a:rPr lang="en-SG" sz="1400" dirty="0">
+                          <a:solidFill>
+                            <a:srgbClr val="FFFFFF"/>
+                          </a:solidFill>
+                          <a:effectLst/>
+                          <a:latin typeface="Segoe UI" panose="020B0502040204020203" pitchFamily="34" charset="0"/>
+                          <a:ea typeface="DengXian" panose="02010600030101010101" pitchFamily="2" charset="-122"/>
+                          <a:cs typeface="Times New Roman" panose="02020603050405020304" pitchFamily="18" charset="0"/>
+                        </a:rPr>
+                        <a:t> </a:t>
+                      </a:r>
+                      <a:endParaRPr lang="en-SG" sz="1100" dirty="0">
+                        <a:effectLst/>
+                        <a:latin typeface="Calibri" panose="020F0502020204030204" pitchFamily="34" charset="0"/>
+                        <a:ea typeface="DengXian" panose="02010600030101010101" pitchFamily="2" charset="-122"/>
+                        <a:cs typeface="Times New Roman" panose="02020603050405020304" pitchFamily="18" charset="0"/>
+                      </a:endParaRPr>
+                    </a:p>
+                    <a:p>
+                      <a:pPr algn="l">
+                        <a:lnSpc>
+                          <a:spcPct val="107000"/>
+                        </a:lnSpc>
+                        <a:spcAft>
+                          <a:spcPts val="0"/>
+                        </a:spcAft>
+                      </a:pPr>
+                      <a:r>
+                        <a:rPr lang="en-SG" sz="1400" b="1" dirty="0">
+                          <a:solidFill>
+                            <a:srgbClr val="FFFFFF"/>
+                          </a:solidFill>
+                          <a:effectLst/>
+                          <a:latin typeface="Segoe UI" panose="020B0502040204020203" pitchFamily="34" charset="0"/>
+                          <a:ea typeface="DengXian" panose="02010600030101010101" pitchFamily="2" charset="-122"/>
+                          <a:cs typeface="Times New Roman" panose="02020603050405020304" pitchFamily="18" charset="0"/>
+                        </a:rPr>
+                        <a:t>Personal Projects</a:t>
+                      </a:r>
+                      <a:r>
+                        <a:rPr lang="en-SG" sz="1400" dirty="0">
+                          <a:solidFill>
+                            <a:srgbClr val="FFFFFF"/>
+                          </a:solidFill>
+                          <a:effectLst/>
+                          <a:latin typeface="Segoe UI" panose="020B0502040204020203" pitchFamily="34" charset="0"/>
+                          <a:ea typeface="DengXian" panose="02010600030101010101" pitchFamily="2" charset="-122"/>
+                          <a:cs typeface="Times New Roman" panose="02020603050405020304" pitchFamily="18" charset="0"/>
+                        </a:rPr>
+                        <a:t> ~projects</a:t>
+                      </a:r>
+                      <a:endParaRPr lang="en-SG" sz="1100" dirty="0">
+                        <a:effectLst/>
+                        <a:latin typeface="Calibri" panose="020F0502020204030204" pitchFamily="34" charset="0"/>
+                        <a:ea typeface="DengXian" panose="02010600030101010101" pitchFamily="2" charset="-122"/>
+                        <a:cs typeface="Times New Roman" panose="02020603050405020304" pitchFamily="18" charset="0"/>
+                      </a:endParaRPr>
+                    </a:p>
+                    <a:p>
+                      <a:pPr algn="l">
+                        <a:lnSpc>
+                          <a:spcPct val="107000"/>
+                        </a:lnSpc>
+                        <a:spcAft>
+                          <a:spcPts val="0"/>
+                        </a:spcAft>
+                      </a:pPr>
+                      <a:r>
+                        <a:rPr lang="en-SG" sz="1400" dirty="0">
+                          <a:solidFill>
+                            <a:srgbClr val="FFFFFF"/>
+                          </a:solidFill>
+                          <a:effectLst/>
+                          <a:latin typeface="Segoe UI" panose="020B0502040204020203" pitchFamily="34" charset="0"/>
+                          <a:ea typeface="DengXian" panose="02010600030101010101" pitchFamily="2" charset="-122"/>
+                          <a:cs typeface="Times New Roman" panose="02020603050405020304" pitchFamily="18" charset="0"/>
+                        </a:rPr>
+                        <a:t>#recent #web #mobile</a:t>
+                      </a:r>
+                      <a:endParaRPr lang="en-SG" sz="1100" dirty="0">
+                        <a:effectLst/>
+                        <a:latin typeface="Calibri" panose="020F0502020204030204" pitchFamily="34" charset="0"/>
+                        <a:ea typeface="DengXian" panose="02010600030101010101" pitchFamily="2" charset="-122"/>
+                        <a:cs typeface="Times New Roman" panose="02020603050405020304" pitchFamily="18" charset="0"/>
+                      </a:endParaRPr>
+                    </a:p>
+                    <a:p>
+                      <a:pPr algn="l">
+                        <a:lnSpc>
+                          <a:spcPct val="107000"/>
+                        </a:lnSpc>
+                        <a:spcAft>
+                          <a:spcPts val="0"/>
+                        </a:spcAft>
+                      </a:pPr>
+                      <a:r>
+                        <a:rPr lang="en-SG" sz="1400" dirty="0">
+                          <a:solidFill>
+                            <a:srgbClr val="FFFFFF"/>
+                          </a:solidFill>
+                          <a:effectLst/>
+                          <a:latin typeface="Segoe UI" panose="020B0502040204020203" pitchFamily="34" charset="0"/>
+                          <a:ea typeface="DengXian" panose="02010600030101010101" pitchFamily="2" charset="-122"/>
+                          <a:cs typeface="Times New Roman" panose="02020603050405020304" pitchFamily="18" charset="0"/>
+                        </a:rPr>
+                        <a:t> </a:t>
+                      </a:r>
+                      <a:endParaRPr lang="en-SG" sz="1100" dirty="0">
+                        <a:effectLst/>
+                        <a:latin typeface="Calibri" panose="020F0502020204030204" pitchFamily="34" charset="0"/>
+                        <a:ea typeface="DengXian" panose="02010600030101010101" pitchFamily="2" charset="-122"/>
+                        <a:cs typeface="Times New Roman" panose="02020603050405020304" pitchFamily="18" charset="0"/>
+                      </a:endParaRPr>
+                    </a:p>
+                    <a:p>
+                      <a:pPr algn="l">
+                        <a:lnSpc>
+                          <a:spcPct val="107000"/>
+                        </a:lnSpc>
+                        <a:spcAft>
+                          <a:spcPts val="0"/>
+                        </a:spcAft>
+                      </a:pPr>
+                      <a:r>
+                        <a:rPr lang="en-SG" sz="1400" b="1" dirty="0">
+                          <a:solidFill>
+                            <a:srgbClr val="FFFFFF"/>
+                          </a:solidFill>
+                          <a:effectLst/>
+                          <a:latin typeface="Segoe UI" panose="020B0502040204020203" pitchFamily="34" charset="0"/>
+                          <a:ea typeface="DengXian" panose="02010600030101010101" pitchFamily="2" charset="-122"/>
+                          <a:cs typeface="Times New Roman" panose="02020603050405020304" pitchFamily="18" charset="0"/>
+                        </a:rPr>
+                        <a:t>Skills </a:t>
+                      </a:r>
+                      <a:r>
+                        <a:rPr lang="en-SG" sz="1400" dirty="0">
+                          <a:solidFill>
+                            <a:srgbClr val="FFFFFF"/>
+                          </a:solidFill>
+                          <a:effectLst/>
+                          <a:latin typeface="Segoe UI" panose="020B0502040204020203" pitchFamily="34" charset="0"/>
+                          <a:ea typeface="DengXian" panose="02010600030101010101" pitchFamily="2" charset="-122"/>
+                          <a:cs typeface="Times New Roman" panose="02020603050405020304" pitchFamily="18" charset="0"/>
+                        </a:rPr>
+                        <a:t>~skills</a:t>
+                      </a:r>
+                      <a:endParaRPr lang="en-SG" sz="1100" dirty="0">
+                        <a:effectLst/>
+                        <a:latin typeface="Calibri" panose="020F0502020204030204" pitchFamily="34" charset="0"/>
+                        <a:ea typeface="DengXian" panose="02010600030101010101" pitchFamily="2" charset="-122"/>
+                        <a:cs typeface="Times New Roman" panose="02020603050405020304" pitchFamily="18" charset="0"/>
+                      </a:endParaRPr>
+                    </a:p>
+                    <a:p>
+                      <a:pPr algn="l">
+                        <a:lnSpc>
+                          <a:spcPct val="107000"/>
+                        </a:lnSpc>
+                        <a:spcAft>
+                          <a:spcPts val="0"/>
+                        </a:spcAft>
+                      </a:pPr>
+                      <a:r>
+                        <a:rPr lang="en-SG" sz="1400" dirty="0">
+                          <a:solidFill>
+                            <a:srgbClr val="FFFFFF"/>
+                          </a:solidFill>
+                          <a:effectLst/>
+                          <a:latin typeface="Segoe UI" panose="020B0502040204020203" pitchFamily="34" charset="0"/>
+                          <a:ea typeface="DengXian" panose="02010600030101010101" pitchFamily="2" charset="-122"/>
+                          <a:cs typeface="Times New Roman" panose="02020603050405020304" pitchFamily="18" charset="0"/>
+                        </a:rPr>
+                        <a:t>#language #framework</a:t>
+                      </a:r>
+                      <a:endParaRPr lang="en-SG" sz="1100" dirty="0">
+                        <a:effectLst/>
+                        <a:latin typeface="Calibri" panose="020F0502020204030204" pitchFamily="34" charset="0"/>
+                        <a:ea typeface="DengXian" panose="02010600030101010101" pitchFamily="2" charset="-122"/>
+                        <a:cs typeface="Times New Roman" panose="02020603050405020304" pitchFamily="18" charset="0"/>
+                      </a:endParaRPr>
+                    </a:p>
+                    <a:p>
+                      <a:pPr algn="l">
+                        <a:lnSpc>
+                          <a:spcPct val="107000"/>
+                        </a:lnSpc>
+                        <a:spcAft>
+                          <a:spcPts val="0"/>
+                        </a:spcAft>
+                      </a:pPr>
+                      <a:r>
+                        <a:rPr lang="en-SG" sz="1400" dirty="0">
+                          <a:solidFill>
+                            <a:srgbClr val="FFFFFF"/>
+                          </a:solidFill>
+                          <a:effectLst/>
+                          <a:latin typeface="Segoe UI" panose="020B0502040204020203" pitchFamily="34" charset="0"/>
+                          <a:ea typeface="DengXian" panose="02010600030101010101" pitchFamily="2" charset="-122"/>
+                          <a:cs typeface="Times New Roman" panose="02020603050405020304" pitchFamily="18" charset="0"/>
+                        </a:rPr>
+                        <a:t> </a:t>
+                      </a:r>
+                      <a:endParaRPr lang="en-SG" sz="1100" dirty="0">
+                        <a:effectLst/>
+                        <a:latin typeface="Calibri" panose="020F0502020204030204" pitchFamily="34" charset="0"/>
+                        <a:ea typeface="DengXian" panose="02010600030101010101" pitchFamily="2" charset="-122"/>
+                        <a:cs typeface="Times New Roman" panose="02020603050405020304" pitchFamily="18" charset="0"/>
+                      </a:endParaRPr>
+                    </a:p>
+                  </a:txBody>
+                  <a:tcPr marL="68580" marR="68580" marT="0" marB="0">
+                    <a:lnL w="12700" cap="flat" cmpd="sng" algn="ctr">
+                      <a:solidFill>
+                        <a:srgbClr val="FFFFFF"/>
+                      </a:solidFill>
+                      <a:prstDash val="solid"/>
+                      <a:round/>
+                      <a:headEnd type="none" w="med" len="med"/>
+                      <a:tailEnd type="none" w="med" len="med"/>
+                    </a:lnL>
+                    <a:lnR w="12700" cap="flat" cmpd="sng" algn="ctr">
+                      <a:solidFill>
+                        <a:srgbClr val="FFFFFF"/>
+                      </a:solidFill>
+                      <a:prstDash val="solid"/>
+                      <a:round/>
+                      <a:headEnd type="none" w="med" len="med"/>
+                      <a:tailEnd type="none" w="med" len="med"/>
+                    </a:lnR>
+                    <a:lnT w="12700" cap="flat" cmpd="sng" algn="ctr">
+                      <a:solidFill>
+                        <a:srgbClr val="FFFFFF"/>
+                      </a:solidFill>
+                      <a:prstDash val="solid"/>
+                      <a:round/>
+                      <a:headEnd type="none" w="med" len="med"/>
+                      <a:tailEnd type="none" w="med" len="med"/>
+                    </a:lnT>
+                    <a:lnB w="12700" cap="flat" cmpd="sng" algn="ctr">
+                      <a:solidFill>
+                        <a:srgbClr val="FFFFFF"/>
+                      </a:solidFill>
+                      <a:prstDash val="solid"/>
+                      <a:round/>
+                      <a:headEnd type="none" w="med" len="med"/>
+                      <a:tailEnd type="none" w="med" len="med"/>
+                    </a:lnB>
+                    <a:solidFill>
+                      <a:srgbClr val="808080"/>
+                    </a:solidFill>
+                  </a:tcPr>
+                </a:tc>
+                <a:extLst>
+                  <a:ext uri="{0D108BD9-81ED-4DB2-BD59-A6C34878D82A}">
+                    <a16:rowId xmlns:a16="http://schemas.microsoft.com/office/drawing/2014/main" val="1555664605"/>
+                  </a:ext>
+                </a:extLst>
+              </a:tr>
+            </a:tbl>
+          </a:graphicData>
+        </a:graphic>
+      </p:graphicFrame>
+    </p:spTree>
+    <p:extLst>
+      <p:ext uri="{BB962C8B-B14F-4D97-AF65-F5344CB8AC3E}">
+        <p14:creationId xmlns:p14="http://schemas.microsoft.com/office/powerpoint/2010/main" val="1232242149"/>
+      </p:ext>
+    </p:extLst>
+  </p:cSld>
+  <p:clrMapOvr>
+    <a:masterClrMapping/>
+  </p:clrMapOvr>
+</p:sld>
+</file>
+
 <file path=ppt/theme/theme1.xml><?xml version="1.0" encoding="utf-8"?>
 <a:theme xmlns:a="http://schemas.openxmlformats.org/drawingml/2006/main" name="Office Theme">
   <a:themeElements>

</xml_diff>

<commit_message>
Remove AB4 reference in UI mockup (#43)
* Add UiMockUp source file

* updated profile pic

* Added new profile pic

* remove previous Ui.png

* Update User guide

Updated entry-related user features

* update developer guide

added in 3 use cases : addContact, addEntry, deleteEntry and editEntry

* Standadize terms

* test trailing white space

* delete duplicated message

* remove trailing white space

* remove trailing whitespace

* modification to UserGuide

* Standardise headings in UG

* standardize headings to all start with capital letter

* Change resuMaker to ResuMaker

* Modify UIMockup
</commit_message>
<xml_diff>
--- a/docs/UiMockup.pptx
+++ b/docs/UiMockup.pptx
@@ -263,7 +263,7 @@
           <a:p>
             <a:fld id="{84F19DAD-07CF-4ACD-8BE5-EDEADED92C64}" type="datetimeFigureOut">
               <a:rPr lang="en-SG" smtClean="0"/>
-              <a:t>2/10/2018</a:t>
+              <a:t>4/10/2018</a:t>
             </a:fld>
             <a:endParaRPr lang="en-SG"/>
           </a:p>
@@ -463,7 +463,7 @@
           <a:p>
             <a:fld id="{84F19DAD-07CF-4ACD-8BE5-EDEADED92C64}" type="datetimeFigureOut">
               <a:rPr lang="en-SG" smtClean="0"/>
-              <a:t>2/10/2018</a:t>
+              <a:t>4/10/2018</a:t>
             </a:fld>
             <a:endParaRPr lang="en-SG"/>
           </a:p>
@@ -673,7 +673,7 @@
           <a:p>
             <a:fld id="{84F19DAD-07CF-4ACD-8BE5-EDEADED92C64}" type="datetimeFigureOut">
               <a:rPr lang="en-SG" smtClean="0"/>
-              <a:t>2/10/2018</a:t>
+              <a:t>4/10/2018</a:t>
             </a:fld>
             <a:endParaRPr lang="en-SG"/>
           </a:p>
@@ -873,7 +873,7 @@
           <a:p>
             <a:fld id="{84F19DAD-07CF-4ACD-8BE5-EDEADED92C64}" type="datetimeFigureOut">
               <a:rPr lang="en-SG" smtClean="0"/>
-              <a:t>2/10/2018</a:t>
+              <a:t>4/10/2018</a:t>
             </a:fld>
             <a:endParaRPr lang="en-SG"/>
           </a:p>
@@ -1149,7 +1149,7 @@
           <a:p>
             <a:fld id="{84F19DAD-07CF-4ACD-8BE5-EDEADED92C64}" type="datetimeFigureOut">
               <a:rPr lang="en-SG" smtClean="0"/>
-              <a:t>2/10/2018</a:t>
+              <a:t>4/10/2018</a:t>
             </a:fld>
             <a:endParaRPr lang="en-SG"/>
           </a:p>
@@ -1417,7 +1417,7 @@
           <a:p>
             <a:fld id="{84F19DAD-07CF-4ACD-8BE5-EDEADED92C64}" type="datetimeFigureOut">
               <a:rPr lang="en-SG" smtClean="0"/>
-              <a:t>2/10/2018</a:t>
+              <a:t>4/10/2018</a:t>
             </a:fld>
             <a:endParaRPr lang="en-SG"/>
           </a:p>
@@ -1832,7 +1832,7 @@
           <a:p>
             <a:fld id="{84F19DAD-07CF-4ACD-8BE5-EDEADED92C64}" type="datetimeFigureOut">
               <a:rPr lang="en-SG" smtClean="0"/>
-              <a:t>2/10/2018</a:t>
+              <a:t>4/10/2018</a:t>
             </a:fld>
             <a:endParaRPr lang="en-SG"/>
           </a:p>
@@ -1974,7 +1974,7 @@
           <a:p>
             <a:fld id="{84F19DAD-07CF-4ACD-8BE5-EDEADED92C64}" type="datetimeFigureOut">
               <a:rPr lang="en-SG" smtClean="0"/>
-              <a:t>2/10/2018</a:t>
+              <a:t>4/10/2018</a:t>
             </a:fld>
             <a:endParaRPr lang="en-SG"/>
           </a:p>
@@ -2087,7 +2087,7 @@
           <a:p>
             <a:fld id="{84F19DAD-07CF-4ACD-8BE5-EDEADED92C64}" type="datetimeFigureOut">
               <a:rPr lang="en-SG" smtClean="0"/>
-              <a:t>2/10/2018</a:t>
+              <a:t>4/10/2018</a:t>
             </a:fld>
             <a:endParaRPr lang="en-SG"/>
           </a:p>
@@ -2400,7 +2400,7 @@
           <a:p>
             <a:fld id="{84F19DAD-07CF-4ACD-8BE5-EDEADED92C64}" type="datetimeFigureOut">
               <a:rPr lang="en-SG" smtClean="0"/>
-              <a:t>2/10/2018</a:t>
+              <a:t>4/10/2018</a:t>
             </a:fld>
             <a:endParaRPr lang="en-SG"/>
           </a:p>
@@ -2689,7 +2689,7 @@
           <a:p>
             <a:fld id="{84F19DAD-07CF-4ACD-8BE5-EDEADED92C64}" type="datetimeFigureOut">
               <a:rPr lang="en-SG" smtClean="0"/>
-              <a:t>2/10/2018</a:t>
+              <a:t>4/10/2018</a:t>
             </a:fld>
             <a:endParaRPr lang="en-SG"/>
           </a:p>
@@ -2932,7 +2932,7 @@
           <a:p>
             <a:fld id="{84F19DAD-07CF-4ACD-8BE5-EDEADED92C64}" type="datetimeFigureOut">
               <a:rPr lang="en-SG" smtClean="0"/>
-              <a:t>2/10/2018</a:t>
+              <a:t>4/10/2018</a:t>
             </a:fld>
             <a:endParaRPr lang="en-SG"/>
           </a:p>
@@ -3371,7 +3371,7 @@
         </p:blipFill>
         <p:spPr>
           <a:xfrm>
-            <a:off x="0" y="-84841"/>
+            <a:off x="0" y="-42421"/>
             <a:ext cx="12104016" cy="6942841"/>
           </a:xfrm>
           <a:prstGeom prst="rect">
@@ -3393,8 +3393,8 @@
         </p:nvSpPr>
         <p:spPr>
           <a:xfrm>
-            <a:off x="320511" y="2205873"/>
-            <a:ext cx="3082565" cy="2103571"/>
+            <a:off x="320511" y="2507265"/>
+            <a:ext cx="3082565" cy="1802179"/>
           </a:xfrm>
           <a:prstGeom prst="rect">
             <a:avLst/>
@@ -3434,6 +3434,19 @@
           </a:p>
           <a:p>
             <a:r>
+              <a:rPr lang="en-SG" sz="1200" b="1" dirty="0">
+                <a:solidFill>
+                  <a:schemeClr val="bg1">
+                    <a:lumMod val="50000"/>
+                  </a:schemeClr>
+                </a:solidFill>
+                <a:highlight>
+                  <a:srgbClr val="00FFFF"/>
+                </a:highlight>
+              </a:rPr>
+              <a:t>Work</a:t>
+            </a:r>
+            <a:r>
               <a:rPr lang="en-SG" sz="1200" dirty="0">
                 <a:solidFill>
                   <a:schemeClr val="bg1"/>
@@ -3442,15 +3455,20 @@
                   <a:srgbClr val="00FFFF"/>
                 </a:highlight>
               </a:rPr>
-              <a:t>Experience</a:t>
+              <a:t> </a:t>
             </a:r>
             <a:r>
               <a:rPr lang="en-SG" sz="1200" dirty="0">
                 <a:solidFill>
-                  <a:schemeClr val="bg1"/>
+                  <a:schemeClr val="bg1">
+                    <a:lumMod val="50000"/>
+                  </a:schemeClr>
                 </a:solidFill>
+                <a:highlight>
+                  <a:srgbClr val="00FFFF"/>
+                </a:highlight>
               </a:rPr>
-              <a:t> </a:t>
+              <a:t>AI</a:t>
             </a:r>
             <a:r>
               <a:rPr lang="en-SG" sz="1200" dirty="0">
@@ -3461,20 +3479,14 @@
                   <a:srgbClr val="00FFFF"/>
                 </a:highlight>
               </a:rPr>
-              <a:t>AI</a:t>
+              <a:t> </a:t>
             </a:r>
             <a:r>
               <a:rPr lang="en-SG" sz="1200" dirty="0">
                 <a:solidFill>
-                  <a:schemeClr val="bg1"/>
-                </a:solidFill>
-              </a:rPr>
-              <a:t> </a:t>
-            </a:r>
-            <a:r>
-              <a:rPr lang="en-SG" sz="1200" dirty="0">
-                <a:solidFill>
-                  <a:schemeClr val="bg1"/>
+                  <a:schemeClr val="bg1">
+                    <a:lumMod val="50000"/>
+                  </a:schemeClr>
                 </a:solidFill>
                 <a:highlight>
                   <a:srgbClr val="00FFFF"/>
@@ -3593,6 +3605,19 @@
           </a:p>
           <a:p>
             <a:r>
+              <a:rPr lang="en-SG" sz="1200" b="1" dirty="0">
+                <a:solidFill>
+                  <a:schemeClr val="bg1">
+                    <a:lumMod val="50000"/>
+                  </a:schemeClr>
+                </a:solidFill>
+                <a:highlight>
+                  <a:srgbClr val="00FFFF"/>
+                </a:highlight>
+              </a:rPr>
+              <a:t>Education</a:t>
+            </a:r>
+            <a:r>
               <a:rPr lang="en-SG" sz="1200" dirty="0">
                 <a:solidFill>
                   <a:schemeClr val="bg1"/>
@@ -3601,8 +3626,42 @@
                   <a:srgbClr val="00FFFF"/>
                 </a:highlight>
               </a:rPr>
-              <a:t>EDUCATION</a:t>
-            </a:r>
+              <a:t>  </a:t>
+            </a:r>
+            <a:r>
+              <a:rPr lang="en-SG" sz="1200" dirty="0">
+                <a:solidFill>
+                  <a:schemeClr val="bg1">
+                    <a:lumMod val="50000"/>
+                  </a:schemeClr>
+                </a:solidFill>
+                <a:highlight>
+                  <a:srgbClr val="00FFFF"/>
+                </a:highlight>
+              </a:rPr>
+              <a:t>Uni</a:t>
+            </a:r>
+            <a:r>
+              <a:rPr lang="en-SG" sz="1200" b="1" dirty="0">
+                <a:solidFill>
+                  <a:schemeClr val="bg1">
+                    <a:lumMod val="50000"/>
+                  </a:schemeClr>
+                </a:solidFill>
+                <a:highlight>
+                  <a:srgbClr val="00FFFF"/>
+                </a:highlight>
+              </a:rPr>
+              <a:t> </a:t>
+            </a:r>
+            <a:endParaRPr lang="en-SG" sz="1200" dirty="0">
+              <a:solidFill>
+                <a:schemeClr val="bg1"/>
+              </a:solidFill>
+              <a:highlight>
+                <a:srgbClr val="00FFFF"/>
+              </a:highlight>
+            </a:endParaRPr>
           </a:p>
           <a:p>
             <a:r>
@@ -3684,14 +3743,144 @@
         </p:blipFill>
         <p:spPr>
           <a:xfrm>
-            <a:off x="3723587" y="2171033"/>
-            <a:ext cx="7126664" cy="4276821"/>
+            <a:off x="4637987" y="2486924"/>
+            <a:ext cx="6024095" cy="3940589"/>
           </a:xfrm>
           <a:prstGeom prst="rect">
             <a:avLst/>
           </a:prstGeom>
         </p:spPr>
       </p:pic>
+      <p:sp>
+        <p:nvSpPr>
+          <p:cNvPr id="8" name="TextBox 7">
+            <a:extLst>
+              <a:ext uri="{FF2B5EF4-FFF2-40B4-BE49-F238E27FC236}">
+                <a16:creationId xmlns:a16="http://schemas.microsoft.com/office/drawing/2014/main" id="{AA8DF081-C703-400D-95D5-3B20ACF839E4}"/>
+              </a:ext>
+            </a:extLst>
+          </p:cNvPr>
+          <p:cNvSpPr txBox="1"/>
+          <p:nvPr/>
+        </p:nvSpPr>
+        <p:spPr>
+          <a:xfrm>
+            <a:off x="245096" y="0"/>
+            <a:ext cx="1096497" cy="261610"/>
+          </a:xfrm>
+          <a:prstGeom prst="rect">
+            <a:avLst/>
+          </a:prstGeom>
+          <a:solidFill>
+            <a:schemeClr val="bg1"/>
+          </a:solidFill>
+        </p:spPr>
+        <p:txBody>
+          <a:bodyPr wrap="square" lIns="36000" rtlCol="0">
+            <a:spAutoFit/>
+          </a:bodyPr>
+          <a:lstStyle/>
+          <a:p>
+            <a:r>
+              <a:rPr lang="en-SG" sz="1100" dirty="0">
+                <a:latin typeface="Segoe UI" panose="020B0502040204020203" pitchFamily="34" charset="0"/>
+                <a:cs typeface="Segoe UI" panose="020B0502040204020203" pitchFamily="34" charset="0"/>
+              </a:rPr>
+              <a:t>ResuMaker</a:t>
+            </a:r>
+          </a:p>
+        </p:txBody>
+      </p:sp>
+      <p:sp>
+        <p:nvSpPr>
+          <p:cNvPr id="11" name="TextBox 10">
+            <a:extLst>
+              <a:ext uri="{FF2B5EF4-FFF2-40B4-BE49-F238E27FC236}">
+                <a16:creationId xmlns:a16="http://schemas.microsoft.com/office/drawing/2014/main" id="{AB3A2152-19B8-4D29-A0EE-FC901CD7F779}"/>
+              </a:ext>
+            </a:extLst>
+          </p:cNvPr>
+          <p:cNvSpPr txBox="1"/>
+          <p:nvPr/>
+        </p:nvSpPr>
+        <p:spPr>
+          <a:xfrm>
+            <a:off x="128762" y="905607"/>
+            <a:ext cx="3045261" cy="307777"/>
+          </a:xfrm>
+          <a:prstGeom prst="rect">
+            <a:avLst/>
+          </a:prstGeom>
+          <a:solidFill>
+            <a:srgbClr val="383838"/>
+          </a:solidFill>
+        </p:spPr>
+        <p:txBody>
+          <a:bodyPr wrap="square" rtlCol="0">
+            <a:spAutoFit/>
+          </a:bodyPr>
+          <a:lstStyle/>
+          <a:p>
+            <a:r>
+              <a:rPr lang="en-SG" sz="1400" dirty="0">
+                <a:solidFill>
+                  <a:schemeClr val="bg1">
+                    <a:lumMod val="50000"/>
+                  </a:schemeClr>
+                </a:solidFill>
+                <a:latin typeface="Segoe UI" panose="020B0502040204020203" pitchFamily="34" charset="0"/>
+                <a:cs typeface="Segoe UI" panose="020B0502040204020203" pitchFamily="34" charset="0"/>
+              </a:rPr>
+              <a:t>Enter command here…</a:t>
+            </a:r>
+          </a:p>
+        </p:txBody>
+      </p:sp>
+      <p:sp>
+        <p:nvSpPr>
+          <p:cNvPr id="12" name="TextBox 11">
+            <a:extLst>
+              <a:ext uri="{FF2B5EF4-FFF2-40B4-BE49-F238E27FC236}">
+                <a16:creationId xmlns:a16="http://schemas.microsoft.com/office/drawing/2014/main" id="{AE21CCA0-D189-453F-AF17-D3A7D268DAB2}"/>
+              </a:ext>
+            </a:extLst>
+          </p:cNvPr>
+          <p:cNvSpPr txBox="1"/>
+          <p:nvPr/>
+        </p:nvSpPr>
+        <p:spPr>
+          <a:xfrm>
+            <a:off x="10363140" y="6565612"/>
+            <a:ext cx="1740876" cy="292388"/>
+          </a:xfrm>
+          <a:prstGeom prst="rect">
+            <a:avLst/>
+          </a:prstGeom>
+          <a:solidFill>
+            <a:srgbClr val="454545"/>
+          </a:solidFill>
+        </p:spPr>
+        <p:txBody>
+          <a:bodyPr wrap="square" rtlCol="0">
+            <a:spAutoFit/>
+          </a:bodyPr>
+          <a:lstStyle/>
+          <a:p>
+            <a:r>
+              <a:rPr lang="en-SG" sz="1300" dirty="0">
+                <a:solidFill>
+                  <a:schemeClr val="bg1">
+                    <a:lumMod val="75000"/>
+                  </a:schemeClr>
+                </a:solidFill>
+                <a:latin typeface="Segoe UI" panose="020B0502040204020203" pitchFamily="34" charset="0"/>
+                <a:cs typeface="Segoe UI" panose="020B0502040204020203" pitchFamily="34" charset="0"/>
+              </a:rPr>
+              <a:t>.\data\entrybook.xml</a:t>
+            </a:r>
+          </a:p>
+        </p:txBody>
+      </p:sp>
     </p:spTree>
     <p:extLst>
       <p:ext uri="{BB962C8B-B14F-4D97-AF65-F5344CB8AC3E}">
@@ -3744,7 +3933,7 @@
         </p:blipFill>
         <p:spPr>
           <a:xfrm>
-            <a:off x="0" y="0"/>
+            <a:off x="0" y="52881"/>
             <a:ext cx="11957538" cy="6858821"/>
           </a:xfrm>
           <a:prstGeom prst="rect">
@@ -4083,8 +4272,8 @@
         </p:nvSpPr>
         <p:spPr>
           <a:xfrm>
-            <a:off x="234462" y="35560"/>
-            <a:ext cx="1096497" cy="261610"/>
+            <a:off x="234462" y="64785"/>
+            <a:ext cx="915608" cy="261610"/>
           </a:xfrm>
           <a:prstGeom prst="rect">
             <a:avLst/>
@@ -4100,16 +4289,12 @@
           <a:lstStyle/>
           <a:p>
             <a:r>
-              <a:rPr lang="en-SG" sz="1100" dirty="0" err="1">
+              <a:rPr lang="en-SG" sz="1100" dirty="0">
                 <a:latin typeface="Segoe UI" panose="020B0502040204020203" pitchFamily="34" charset="0"/>
                 <a:cs typeface="Segoe UI" panose="020B0502040204020203" pitchFamily="34" charset="0"/>
               </a:rPr>
               <a:t>ResuMaker</a:t>
             </a:r>
-            <a:endParaRPr lang="en-SG" sz="1100" dirty="0">
-              <a:latin typeface="Segoe UI" panose="020B0502040204020203" pitchFamily="34" charset="0"/>
-              <a:cs typeface="Segoe UI" panose="020B0502040204020203" pitchFamily="34" charset="0"/>
-            </a:endParaRPr>
           </a:p>
         </p:txBody>
       </p:sp>
@@ -4187,7 +4372,7 @@
         </p:blipFill>
         <p:spPr>
           <a:xfrm>
-            <a:off x="4992198" y="2524858"/>
+            <a:off x="4841822" y="2522365"/>
             <a:ext cx="4978279" cy="3942863"/>
           </a:xfrm>
           <a:prstGeom prst="rect">
@@ -4209,7 +4394,7 @@
         </p:nvSpPr>
         <p:spPr>
           <a:xfrm>
-            <a:off x="128762" y="905607"/>
+            <a:off x="157042" y="993531"/>
             <a:ext cx="3045261" cy="307777"/>
           </a:xfrm>
           <a:prstGeom prst="rect">
@@ -4254,7 +4439,7 @@
         </p:nvSpPr>
         <p:spPr>
           <a:xfrm>
-            <a:off x="10313378" y="6556820"/>
+            <a:off x="10216662" y="6565612"/>
             <a:ext cx="1740876" cy="292388"/>
           </a:xfrm>
           <a:prstGeom prst="rect">
@@ -4277,11 +4462,60 @@
                     <a:lumMod val="75000"/>
                   </a:schemeClr>
                 </a:solidFill>
+                <a:highlight>
+                  <a:srgbClr val="454545"/>
+                </a:highlight>
                 <a:latin typeface="Segoe UI" panose="020B0502040204020203" pitchFamily="34" charset="0"/>
                 <a:cs typeface="Segoe UI" panose="020B0502040204020203" pitchFamily="34" charset="0"/>
               </a:rPr>
               <a:t>.\data\entrybook.xml</a:t>
             </a:r>
+          </a:p>
+        </p:txBody>
+      </p:sp>
+      <p:sp>
+        <p:nvSpPr>
+          <p:cNvPr id="6" name="Rectangle 5">
+            <a:extLst>
+              <a:ext uri="{FF2B5EF4-FFF2-40B4-BE49-F238E27FC236}">
+                <a16:creationId xmlns:a16="http://schemas.microsoft.com/office/drawing/2014/main" id="{54104F9C-2E42-4313-BD41-2F9CE3F28BA9}"/>
+              </a:ext>
+            </a:extLst>
+          </p:cNvPr>
+          <p:cNvSpPr/>
+          <p:nvPr/>
+        </p:nvSpPr>
+        <p:spPr>
+          <a:xfrm>
+            <a:off x="6306532" y="1583703"/>
+            <a:ext cx="1074656" cy="273377"/>
+          </a:xfrm>
+          <a:prstGeom prst="rect">
+            <a:avLst/>
+          </a:prstGeom>
+        </p:spPr>
+        <p:style>
+          <a:lnRef idx="2">
+            <a:schemeClr val="dk1">
+              <a:shade val="50000"/>
+            </a:schemeClr>
+          </a:lnRef>
+          <a:fillRef idx="1">
+            <a:schemeClr val="dk1"/>
+          </a:fillRef>
+          <a:effectRef idx="0">
+            <a:schemeClr val="dk1"/>
+          </a:effectRef>
+          <a:fontRef idx="minor">
+            <a:schemeClr val="lt1"/>
+          </a:fontRef>
+        </p:style>
+        <p:txBody>
+          <a:bodyPr rtlCol="0" anchor="ctr"/>
+          <a:lstStyle/>
+          <a:p>
+            <a:pPr algn="ctr"/>
+            <a:endParaRPr lang="en-SG" dirty="0"/>
           </a:p>
         </p:txBody>
       </p:sp>
@@ -4329,7 +4563,7 @@
         </p:nvSpPr>
         <p:spPr>
           <a:xfrm>
-            <a:off x="1626577" y="880523"/>
+            <a:off x="1555555" y="898278"/>
             <a:ext cx="8088923" cy="5612352"/>
           </a:xfrm>
           <a:prstGeom prst="rect">

</xml_diff>

<commit_message>
Update UI Mockup (#50)
* Add template related information in docs

* Update UI mockup

* Update readme to use modified ui.png
</commit_message>
<xml_diff>
--- a/docs/UiMockup.pptx
+++ b/docs/UiMockup.pptx
@@ -263,7 +263,7 @@
           <a:p>
             <a:fld id="{84F19DAD-07CF-4ACD-8BE5-EDEADED92C64}" type="datetimeFigureOut">
               <a:rPr lang="en-SG" smtClean="0"/>
-              <a:t>4/10/2018</a:t>
+              <a:t>2/10/2018</a:t>
             </a:fld>
             <a:endParaRPr lang="en-SG"/>
           </a:p>
@@ -463,7 +463,7 @@
           <a:p>
             <a:fld id="{84F19DAD-07CF-4ACD-8BE5-EDEADED92C64}" type="datetimeFigureOut">
               <a:rPr lang="en-SG" smtClean="0"/>
-              <a:t>4/10/2018</a:t>
+              <a:t>2/10/2018</a:t>
             </a:fld>
             <a:endParaRPr lang="en-SG"/>
           </a:p>
@@ -673,7 +673,7 @@
           <a:p>
             <a:fld id="{84F19DAD-07CF-4ACD-8BE5-EDEADED92C64}" type="datetimeFigureOut">
               <a:rPr lang="en-SG" smtClean="0"/>
-              <a:t>4/10/2018</a:t>
+              <a:t>2/10/2018</a:t>
             </a:fld>
             <a:endParaRPr lang="en-SG"/>
           </a:p>
@@ -873,7 +873,7 @@
           <a:p>
             <a:fld id="{84F19DAD-07CF-4ACD-8BE5-EDEADED92C64}" type="datetimeFigureOut">
               <a:rPr lang="en-SG" smtClean="0"/>
-              <a:t>4/10/2018</a:t>
+              <a:t>2/10/2018</a:t>
             </a:fld>
             <a:endParaRPr lang="en-SG"/>
           </a:p>
@@ -1149,7 +1149,7 @@
           <a:p>
             <a:fld id="{84F19DAD-07CF-4ACD-8BE5-EDEADED92C64}" type="datetimeFigureOut">
               <a:rPr lang="en-SG" smtClean="0"/>
-              <a:t>4/10/2018</a:t>
+              <a:t>2/10/2018</a:t>
             </a:fld>
             <a:endParaRPr lang="en-SG"/>
           </a:p>
@@ -1417,7 +1417,7 @@
           <a:p>
             <a:fld id="{84F19DAD-07CF-4ACD-8BE5-EDEADED92C64}" type="datetimeFigureOut">
               <a:rPr lang="en-SG" smtClean="0"/>
-              <a:t>4/10/2018</a:t>
+              <a:t>2/10/2018</a:t>
             </a:fld>
             <a:endParaRPr lang="en-SG"/>
           </a:p>
@@ -1832,7 +1832,7 @@
           <a:p>
             <a:fld id="{84F19DAD-07CF-4ACD-8BE5-EDEADED92C64}" type="datetimeFigureOut">
               <a:rPr lang="en-SG" smtClean="0"/>
-              <a:t>4/10/2018</a:t>
+              <a:t>2/10/2018</a:t>
             </a:fld>
             <a:endParaRPr lang="en-SG"/>
           </a:p>
@@ -1974,7 +1974,7 @@
           <a:p>
             <a:fld id="{84F19DAD-07CF-4ACD-8BE5-EDEADED92C64}" type="datetimeFigureOut">
               <a:rPr lang="en-SG" smtClean="0"/>
-              <a:t>4/10/2018</a:t>
+              <a:t>2/10/2018</a:t>
             </a:fld>
             <a:endParaRPr lang="en-SG"/>
           </a:p>
@@ -2087,7 +2087,7 @@
           <a:p>
             <a:fld id="{84F19DAD-07CF-4ACD-8BE5-EDEADED92C64}" type="datetimeFigureOut">
               <a:rPr lang="en-SG" smtClean="0"/>
-              <a:t>4/10/2018</a:t>
+              <a:t>2/10/2018</a:t>
             </a:fld>
             <a:endParaRPr lang="en-SG"/>
           </a:p>
@@ -2400,7 +2400,7 @@
           <a:p>
             <a:fld id="{84F19DAD-07CF-4ACD-8BE5-EDEADED92C64}" type="datetimeFigureOut">
               <a:rPr lang="en-SG" smtClean="0"/>
-              <a:t>4/10/2018</a:t>
+              <a:t>2/10/2018</a:t>
             </a:fld>
             <a:endParaRPr lang="en-SG"/>
           </a:p>
@@ -2689,7 +2689,7 @@
           <a:p>
             <a:fld id="{84F19DAD-07CF-4ACD-8BE5-EDEADED92C64}" type="datetimeFigureOut">
               <a:rPr lang="en-SG" smtClean="0"/>
-              <a:t>4/10/2018</a:t>
+              <a:t>2/10/2018</a:t>
             </a:fld>
             <a:endParaRPr lang="en-SG"/>
           </a:p>
@@ -2932,7 +2932,7 @@
           <a:p>
             <a:fld id="{84F19DAD-07CF-4ACD-8BE5-EDEADED92C64}" type="datetimeFigureOut">
               <a:rPr lang="en-SG" smtClean="0"/>
-              <a:t>4/10/2018</a:t>
+              <a:t>2/10/2018</a:t>
             </a:fld>
             <a:endParaRPr lang="en-SG"/>
           </a:p>
@@ -3371,7 +3371,7 @@
         </p:blipFill>
         <p:spPr>
           <a:xfrm>
-            <a:off x="0" y="-42421"/>
+            <a:off x="0" y="-84841"/>
             <a:ext cx="12104016" cy="6942841"/>
           </a:xfrm>
           <a:prstGeom prst="rect">
@@ -3393,8 +3393,8 @@
         </p:nvSpPr>
         <p:spPr>
           <a:xfrm>
-            <a:off x="320511" y="2507265"/>
-            <a:ext cx="3082565" cy="1802179"/>
+            <a:off x="320511" y="2205873"/>
+            <a:ext cx="3082565" cy="2103571"/>
           </a:xfrm>
           <a:prstGeom prst="rect">
             <a:avLst/>
@@ -3434,19 +3434,6 @@
           </a:p>
           <a:p>
             <a:r>
-              <a:rPr lang="en-SG" sz="1200" b="1" dirty="0">
-                <a:solidFill>
-                  <a:schemeClr val="bg1">
-                    <a:lumMod val="50000"/>
-                  </a:schemeClr>
-                </a:solidFill>
-                <a:highlight>
-                  <a:srgbClr val="00FFFF"/>
-                </a:highlight>
-              </a:rPr>
-              <a:t>Work</a:t>
-            </a:r>
-            <a:r>
               <a:rPr lang="en-SG" sz="1200" dirty="0">
                 <a:solidFill>
                   <a:schemeClr val="bg1"/>
@@ -3455,20 +3442,15 @@
                   <a:srgbClr val="00FFFF"/>
                 </a:highlight>
               </a:rPr>
-              <a:t> </a:t>
+              <a:t>Experience</a:t>
             </a:r>
             <a:r>
               <a:rPr lang="en-SG" sz="1200" dirty="0">
                 <a:solidFill>
-                  <a:schemeClr val="bg1">
-                    <a:lumMod val="50000"/>
-                  </a:schemeClr>
+                  <a:schemeClr val="bg1"/>
                 </a:solidFill>
-                <a:highlight>
-                  <a:srgbClr val="00FFFF"/>
-                </a:highlight>
               </a:rPr>
-              <a:t>AI</a:t>
+              <a:t> </a:t>
             </a:r>
             <a:r>
               <a:rPr lang="en-SG" sz="1200" dirty="0">
@@ -3479,14 +3461,20 @@
                   <a:srgbClr val="00FFFF"/>
                 </a:highlight>
               </a:rPr>
-              <a:t> </a:t>
+              <a:t>AI</a:t>
             </a:r>
             <a:r>
               <a:rPr lang="en-SG" sz="1200" dirty="0">
                 <a:solidFill>
-                  <a:schemeClr val="bg1">
-                    <a:lumMod val="50000"/>
-                  </a:schemeClr>
+                  <a:schemeClr val="bg1"/>
+                </a:solidFill>
+              </a:rPr>
+              <a:t> </a:t>
+            </a:r>
+            <a:r>
+              <a:rPr lang="en-SG" sz="1200" dirty="0">
+                <a:solidFill>
+                  <a:schemeClr val="bg1"/>
                 </a:solidFill>
                 <a:highlight>
                   <a:srgbClr val="00FFFF"/>
@@ -3605,19 +3593,6 @@
           </a:p>
           <a:p>
             <a:r>
-              <a:rPr lang="en-SG" sz="1200" b="1" dirty="0">
-                <a:solidFill>
-                  <a:schemeClr val="bg1">
-                    <a:lumMod val="50000"/>
-                  </a:schemeClr>
-                </a:solidFill>
-                <a:highlight>
-                  <a:srgbClr val="00FFFF"/>
-                </a:highlight>
-              </a:rPr>
-              <a:t>Education</a:t>
-            </a:r>
-            <a:r>
               <a:rPr lang="en-SG" sz="1200" dirty="0">
                 <a:solidFill>
                   <a:schemeClr val="bg1"/>
@@ -3626,42 +3601,8 @@
                   <a:srgbClr val="00FFFF"/>
                 </a:highlight>
               </a:rPr>
-              <a:t>  </a:t>
-            </a:r>
-            <a:r>
-              <a:rPr lang="en-SG" sz="1200" dirty="0">
-                <a:solidFill>
-                  <a:schemeClr val="bg1">
-                    <a:lumMod val="50000"/>
-                  </a:schemeClr>
-                </a:solidFill>
-                <a:highlight>
-                  <a:srgbClr val="00FFFF"/>
-                </a:highlight>
-              </a:rPr>
-              <a:t>Uni</a:t>
-            </a:r>
-            <a:r>
-              <a:rPr lang="en-SG" sz="1200" b="1" dirty="0">
-                <a:solidFill>
-                  <a:schemeClr val="bg1">
-                    <a:lumMod val="50000"/>
-                  </a:schemeClr>
-                </a:solidFill>
-                <a:highlight>
-                  <a:srgbClr val="00FFFF"/>
-                </a:highlight>
-              </a:rPr>
-              <a:t> </a:t>
-            </a:r>
-            <a:endParaRPr lang="en-SG" sz="1200" dirty="0">
-              <a:solidFill>
-                <a:schemeClr val="bg1"/>
-              </a:solidFill>
-              <a:highlight>
-                <a:srgbClr val="00FFFF"/>
-              </a:highlight>
-            </a:endParaRPr>
+              <a:t>EDUCATION</a:t>
+            </a:r>
           </a:p>
           <a:p>
             <a:r>
@@ -3743,144 +3684,14 @@
         </p:blipFill>
         <p:spPr>
           <a:xfrm>
-            <a:off x="4637987" y="2486924"/>
-            <a:ext cx="6024095" cy="3940589"/>
+            <a:off x="3723587" y="2171033"/>
+            <a:ext cx="7126664" cy="4276821"/>
           </a:xfrm>
           <a:prstGeom prst="rect">
             <a:avLst/>
           </a:prstGeom>
         </p:spPr>
       </p:pic>
-      <p:sp>
-        <p:nvSpPr>
-          <p:cNvPr id="8" name="TextBox 7">
-            <a:extLst>
-              <a:ext uri="{FF2B5EF4-FFF2-40B4-BE49-F238E27FC236}">
-                <a16:creationId xmlns:a16="http://schemas.microsoft.com/office/drawing/2014/main" id="{AA8DF081-C703-400D-95D5-3B20ACF839E4}"/>
-              </a:ext>
-            </a:extLst>
-          </p:cNvPr>
-          <p:cNvSpPr txBox="1"/>
-          <p:nvPr/>
-        </p:nvSpPr>
-        <p:spPr>
-          <a:xfrm>
-            <a:off x="245096" y="0"/>
-            <a:ext cx="1096497" cy="261610"/>
-          </a:xfrm>
-          <a:prstGeom prst="rect">
-            <a:avLst/>
-          </a:prstGeom>
-          <a:solidFill>
-            <a:schemeClr val="bg1"/>
-          </a:solidFill>
-        </p:spPr>
-        <p:txBody>
-          <a:bodyPr wrap="square" lIns="36000" rtlCol="0">
-            <a:spAutoFit/>
-          </a:bodyPr>
-          <a:lstStyle/>
-          <a:p>
-            <a:r>
-              <a:rPr lang="en-SG" sz="1100" dirty="0">
-                <a:latin typeface="Segoe UI" panose="020B0502040204020203" pitchFamily="34" charset="0"/>
-                <a:cs typeface="Segoe UI" panose="020B0502040204020203" pitchFamily="34" charset="0"/>
-              </a:rPr>
-              <a:t>ResuMaker</a:t>
-            </a:r>
-          </a:p>
-        </p:txBody>
-      </p:sp>
-      <p:sp>
-        <p:nvSpPr>
-          <p:cNvPr id="11" name="TextBox 10">
-            <a:extLst>
-              <a:ext uri="{FF2B5EF4-FFF2-40B4-BE49-F238E27FC236}">
-                <a16:creationId xmlns:a16="http://schemas.microsoft.com/office/drawing/2014/main" id="{AB3A2152-19B8-4D29-A0EE-FC901CD7F779}"/>
-              </a:ext>
-            </a:extLst>
-          </p:cNvPr>
-          <p:cNvSpPr txBox="1"/>
-          <p:nvPr/>
-        </p:nvSpPr>
-        <p:spPr>
-          <a:xfrm>
-            <a:off x="128762" y="905607"/>
-            <a:ext cx="3045261" cy="307777"/>
-          </a:xfrm>
-          <a:prstGeom prst="rect">
-            <a:avLst/>
-          </a:prstGeom>
-          <a:solidFill>
-            <a:srgbClr val="383838"/>
-          </a:solidFill>
-        </p:spPr>
-        <p:txBody>
-          <a:bodyPr wrap="square" rtlCol="0">
-            <a:spAutoFit/>
-          </a:bodyPr>
-          <a:lstStyle/>
-          <a:p>
-            <a:r>
-              <a:rPr lang="en-SG" sz="1400" dirty="0">
-                <a:solidFill>
-                  <a:schemeClr val="bg1">
-                    <a:lumMod val="50000"/>
-                  </a:schemeClr>
-                </a:solidFill>
-                <a:latin typeface="Segoe UI" panose="020B0502040204020203" pitchFamily="34" charset="0"/>
-                <a:cs typeface="Segoe UI" panose="020B0502040204020203" pitchFamily="34" charset="0"/>
-              </a:rPr>
-              <a:t>Enter command here…</a:t>
-            </a:r>
-          </a:p>
-        </p:txBody>
-      </p:sp>
-      <p:sp>
-        <p:nvSpPr>
-          <p:cNvPr id="12" name="TextBox 11">
-            <a:extLst>
-              <a:ext uri="{FF2B5EF4-FFF2-40B4-BE49-F238E27FC236}">
-                <a16:creationId xmlns:a16="http://schemas.microsoft.com/office/drawing/2014/main" id="{AE21CCA0-D189-453F-AF17-D3A7D268DAB2}"/>
-              </a:ext>
-            </a:extLst>
-          </p:cNvPr>
-          <p:cNvSpPr txBox="1"/>
-          <p:nvPr/>
-        </p:nvSpPr>
-        <p:spPr>
-          <a:xfrm>
-            <a:off x="10363140" y="6565612"/>
-            <a:ext cx="1740876" cy="292388"/>
-          </a:xfrm>
-          <a:prstGeom prst="rect">
-            <a:avLst/>
-          </a:prstGeom>
-          <a:solidFill>
-            <a:srgbClr val="454545"/>
-          </a:solidFill>
-        </p:spPr>
-        <p:txBody>
-          <a:bodyPr wrap="square" rtlCol="0">
-            <a:spAutoFit/>
-          </a:bodyPr>
-          <a:lstStyle/>
-          <a:p>
-            <a:r>
-              <a:rPr lang="en-SG" sz="1300" dirty="0">
-                <a:solidFill>
-                  <a:schemeClr val="bg1">
-                    <a:lumMod val="75000"/>
-                  </a:schemeClr>
-                </a:solidFill>
-                <a:latin typeface="Segoe UI" panose="020B0502040204020203" pitchFamily="34" charset="0"/>
-                <a:cs typeface="Segoe UI" panose="020B0502040204020203" pitchFamily="34" charset="0"/>
-              </a:rPr>
-              <a:t>.\data\entrybook.xml</a:t>
-            </a:r>
-          </a:p>
-        </p:txBody>
-      </p:sp>
     </p:spTree>
     <p:extLst>
       <p:ext uri="{BB962C8B-B14F-4D97-AF65-F5344CB8AC3E}">
@@ -3933,7 +3744,7 @@
         </p:blipFill>
         <p:spPr>
           <a:xfrm>
-            <a:off x="0" y="52881"/>
+            <a:off x="0" y="0"/>
             <a:ext cx="11957538" cy="6858821"/>
           </a:xfrm>
           <a:prstGeom prst="rect">
@@ -4272,8 +4083,8 @@
         </p:nvSpPr>
         <p:spPr>
           <a:xfrm>
-            <a:off x="234462" y="64785"/>
-            <a:ext cx="915608" cy="261610"/>
+            <a:off x="234462" y="35560"/>
+            <a:ext cx="1096497" cy="261610"/>
           </a:xfrm>
           <a:prstGeom prst="rect">
             <a:avLst/>
@@ -4289,12 +4100,16 @@
           <a:lstStyle/>
           <a:p>
             <a:r>
-              <a:rPr lang="en-SG" sz="1100" dirty="0">
+              <a:rPr lang="en-SG" sz="1100" dirty="0" err="1">
                 <a:latin typeface="Segoe UI" panose="020B0502040204020203" pitchFamily="34" charset="0"/>
                 <a:cs typeface="Segoe UI" panose="020B0502040204020203" pitchFamily="34" charset="0"/>
               </a:rPr>
               <a:t>ResuMaker</a:t>
             </a:r>
+            <a:endParaRPr lang="en-SG" sz="1100" dirty="0">
+              <a:latin typeface="Segoe UI" panose="020B0502040204020203" pitchFamily="34" charset="0"/>
+              <a:cs typeface="Segoe UI" panose="020B0502040204020203" pitchFamily="34" charset="0"/>
+            </a:endParaRPr>
           </a:p>
         </p:txBody>
       </p:sp>
@@ -4372,7 +4187,7 @@
         </p:blipFill>
         <p:spPr>
           <a:xfrm>
-            <a:off x="4841822" y="2522365"/>
+            <a:off x="4992198" y="2524858"/>
             <a:ext cx="4978279" cy="3942863"/>
           </a:xfrm>
           <a:prstGeom prst="rect">
@@ -4394,7 +4209,7 @@
         </p:nvSpPr>
         <p:spPr>
           <a:xfrm>
-            <a:off x="157042" y="993531"/>
+            <a:off x="128762" y="905607"/>
             <a:ext cx="3045261" cy="307777"/>
           </a:xfrm>
           <a:prstGeom prst="rect">
@@ -4439,7 +4254,7 @@
         </p:nvSpPr>
         <p:spPr>
           <a:xfrm>
-            <a:off x="10216662" y="6565612"/>
+            <a:off x="10313378" y="6556820"/>
             <a:ext cx="1740876" cy="292388"/>
           </a:xfrm>
           <a:prstGeom prst="rect">
@@ -4462,60 +4277,11 @@
                     <a:lumMod val="75000"/>
                   </a:schemeClr>
                 </a:solidFill>
-                <a:highlight>
-                  <a:srgbClr val="454545"/>
-                </a:highlight>
                 <a:latin typeface="Segoe UI" panose="020B0502040204020203" pitchFamily="34" charset="0"/>
                 <a:cs typeface="Segoe UI" panose="020B0502040204020203" pitchFamily="34" charset="0"/>
               </a:rPr>
               <a:t>.\data\entrybook.xml</a:t>
             </a:r>
-          </a:p>
-        </p:txBody>
-      </p:sp>
-      <p:sp>
-        <p:nvSpPr>
-          <p:cNvPr id="6" name="Rectangle 5">
-            <a:extLst>
-              <a:ext uri="{FF2B5EF4-FFF2-40B4-BE49-F238E27FC236}">
-                <a16:creationId xmlns:a16="http://schemas.microsoft.com/office/drawing/2014/main" id="{54104F9C-2E42-4313-BD41-2F9CE3F28BA9}"/>
-              </a:ext>
-            </a:extLst>
-          </p:cNvPr>
-          <p:cNvSpPr/>
-          <p:nvPr/>
-        </p:nvSpPr>
-        <p:spPr>
-          <a:xfrm>
-            <a:off x="6306532" y="1583703"/>
-            <a:ext cx="1074656" cy="273377"/>
-          </a:xfrm>
-          <a:prstGeom prst="rect">
-            <a:avLst/>
-          </a:prstGeom>
-        </p:spPr>
-        <p:style>
-          <a:lnRef idx="2">
-            <a:schemeClr val="dk1">
-              <a:shade val="50000"/>
-            </a:schemeClr>
-          </a:lnRef>
-          <a:fillRef idx="1">
-            <a:schemeClr val="dk1"/>
-          </a:fillRef>
-          <a:effectRef idx="0">
-            <a:schemeClr val="dk1"/>
-          </a:effectRef>
-          <a:fontRef idx="minor">
-            <a:schemeClr val="lt1"/>
-          </a:fontRef>
-        </p:style>
-        <p:txBody>
-          <a:bodyPr rtlCol="0" anchor="ctr"/>
-          <a:lstStyle/>
-          <a:p>
-            <a:pPr algn="ctr"/>
-            <a:endParaRPr lang="en-SG" dirty="0"/>
           </a:p>
         </p:txBody>
       </p:sp>
@@ -4563,7 +4329,7 @@
         </p:nvSpPr>
         <p:spPr>
           <a:xfrm>
-            <a:off x="1555555" y="898278"/>
+            <a:off x="1626577" y="880523"/>
             <a:ext cx="8088923" cy="5612352"/>
           </a:xfrm>
           <a:prstGeom prst="rect">

</xml_diff>